<commit_message>
Updates for StirTrek 2013
</commit_message>
<xml_diff>
--- a/RealWorldMobileAppDevelopment.pptx
+++ b/RealWorldMobileAppDevelopment.pptx
@@ -5,10 +5,10 @@
     <p:sldMasterId id="2147483661" r:id="rId1"/>
   </p:sldMasterIdLst>
   <p:notesMasterIdLst>
-    <p:notesMasterId r:id="rId19"/>
+    <p:notesMasterId r:id="rId23"/>
   </p:notesMasterIdLst>
   <p:handoutMasterIdLst>
-    <p:handoutMasterId r:id="rId20"/>
+    <p:handoutMasterId r:id="rId24"/>
   </p:handoutMasterIdLst>
   <p:sldIdLst>
     <p:sldId id="256" r:id="rId2"/>
@@ -16,18 +16,22 @@
     <p:sldId id="258" r:id="rId4"/>
     <p:sldId id="271" r:id="rId5"/>
     <p:sldId id="272" r:id="rId6"/>
-    <p:sldId id="273" r:id="rId7"/>
-    <p:sldId id="259" r:id="rId8"/>
-    <p:sldId id="260" r:id="rId9"/>
-    <p:sldId id="267" r:id="rId10"/>
-    <p:sldId id="261" r:id="rId11"/>
-    <p:sldId id="262" r:id="rId12"/>
-    <p:sldId id="269" r:id="rId13"/>
-    <p:sldId id="263" r:id="rId14"/>
-    <p:sldId id="264" r:id="rId15"/>
-    <p:sldId id="268" r:id="rId16"/>
-    <p:sldId id="270" r:id="rId17"/>
-    <p:sldId id="266" r:id="rId18"/>
+    <p:sldId id="278" r:id="rId7"/>
+    <p:sldId id="273" r:id="rId8"/>
+    <p:sldId id="259" r:id="rId9"/>
+    <p:sldId id="260" r:id="rId10"/>
+    <p:sldId id="267" r:id="rId11"/>
+    <p:sldId id="261" r:id="rId12"/>
+    <p:sldId id="262" r:id="rId13"/>
+    <p:sldId id="269" r:id="rId14"/>
+    <p:sldId id="263" r:id="rId15"/>
+    <p:sldId id="274" r:id="rId16"/>
+    <p:sldId id="277" r:id="rId17"/>
+    <p:sldId id="276" r:id="rId18"/>
+    <p:sldId id="264" r:id="rId19"/>
+    <p:sldId id="268" r:id="rId20"/>
+    <p:sldId id="270" r:id="rId21"/>
+    <p:sldId id="266" r:id="rId22"/>
   </p:sldIdLst>
   <p:sldSz cx="9144000" cy="6858000" type="screen4x3"/>
   <p:notesSz cx="6858000" cy="9296400"/>
@@ -510,7 +514,7 @@
             <a:fld id="{E6D40A8B-9DB3-D940-9E32-81E2BCF9697E}" type="datetimeFigureOut">
               <a:rPr lang="en-US"/>
               <a:pPr/>
-              <a:t>10/19/12</a:t>
+              <a:t>4/20/13</a:t>
             </a:fld>
             <a:endParaRPr lang="en-US"/>
           </a:p>
@@ -1062,7 +1066,7 @@
             <a:fld id="{119C53A1-7820-2F4F-8D14-EDD3E312038F}" type="slidenum">
               <a:rPr lang="en-US" smtClean="0"/>
               <a:pPr/>
-              <a:t>10</a:t>
+              <a:t>11</a:t>
             </a:fld>
             <a:endParaRPr lang="en-US"/>
           </a:p>
@@ -1178,7 +1182,7 @@
             <a:fld id="{119C53A1-7820-2F4F-8D14-EDD3E312038F}" type="slidenum">
               <a:rPr lang="en-US" smtClean="0"/>
               <a:pPr/>
-              <a:t>11</a:t>
+              <a:t>12</a:t>
             </a:fld>
             <a:endParaRPr lang="en-US"/>
           </a:p>
@@ -1468,7 +1472,7 @@
             <a:fld id="{119C53A1-7820-2F4F-8D14-EDD3E312038F}" type="slidenum">
               <a:rPr lang="en-US" smtClean="0"/>
               <a:pPr/>
-              <a:t>12</a:t>
+              <a:t>13</a:t>
             </a:fld>
             <a:endParaRPr lang="en-US"/>
           </a:p>
@@ -1714,7 +1718,7 @@
             <a:fld id="{119C53A1-7820-2F4F-8D14-EDD3E312038F}" type="slidenum">
               <a:rPr lang="en-US" smtClean="0"/>
               <a:pPr/>
-              <a:t>13</a:t>
+              <a:t>14</a:t>
             </a:fld>
             <a:endParaRPr lang="en-US"/>
           </a:p>
@@ -1779,6 +1783,119 @@
           <a:p>
             <a:r>
               <a:rPr lang="en-US" dirty="0" smtClean="0"/>
+              <a:t>Talking points:</a:t>
+            </a:r>
+          </a:p>
+          <a:p>
+            <a:pPr marL="171450" indent="-171450">
+              <a:buFontTx/>
+              <a:buChar char="-"/>
+            </a:pPr>
+            <a:r>
+              <a:rPr lang="en-US" dirty="0" smtClean="0"/>
+              <a:t>Is it really necessary to support</a:t>
+            </a:r>
+            <a:r>
+              <a:rPr lang="en-US" baseline="0" dirty="0" smtClean="0"/>
+              <a:t> portrait and landscape?</a:t>
+            </a:r>
+          </a:p>
+          <a:p>
+            <a:pPr marL="171450" indent="-171450">
+              <a:buFontTx/>
+              <a:buChar char="-"/>
+            </a:pPr>
+            <a:r>
+              <a:rPr lang="en-US" baseline="0" dirty="0" smtClean="0"/>
+              <a:t>Choose supported devices up front and code to those resolutions</a:t>
+            </a:r>
+            <a:endParaRPr lang="en-US" dirty="0"/>
+          </a:p>
+        </p:txBody>
+      </p:sp>
+      <p:sp>
+        <p:nvSpPr>
+          <p:cNvPr id="4" name="Slide Number Placeholder 3"/>
+          <p:cNvSpPr>
+            <a:spLocks noGrp="1"/>
+          </p:cNvSpPr>
+          <p:nvPr>
+            <p:ph type="sldNum" sz="quarter" idx="10"/>
+          </p:nvPr>
+        </p:nvSpPr>
+        <p:spPr/>
+        <p:txBody>
+          <a:bodyPr/>
+          <a:lstStyle/>
+          <a:p>
+            <a:fld id="{119C53A1-7820-2F4F-8D14-EDD3E312038F}" type="slidenum">
+              <a:rPr lang="en-US" smtClean="0"/>
+              <a:pPr/>
+              <a:t>16</a:t>
+            </a:fld>
+            <a:endParaRPr lang="en-US"/>
+          </a:p>
+        </p:txBody>
+      </p:sp>
+    </p:spTree>
+    <p:extLst>
+      <p:ext uri="{BB962C8B-B14F-4D97-AF65-F5344CB8AC3E}">
+        <p14:creationId xmlns:p14="http://schemas.microsoft.com/office/powerpoint/2010/main" val="718155417"/>
+      </p:ext>
+    </p:extLst>
+  </p:cSld>
+  <p:clrMapOvr>
+    <a:masterClrMapping/>
+  </p:clrMapOvr>
+</p:notes>
+</file>
+
+<file path=ppt/notesSlides/notesSlide15.xml><?xml version="1.0" encoding="utf-8"?>
+<p:notes xmlns:a="http://schemas.openxmlformats.org/drawingml/2006/main" xmlns:r="http://schemas.openxmlformats.org/officeDocument/2006/relationships" xmlns:p="http://schemas.openxmlformats.org/presentationml/2006/main">
+  <p:cSld>
+    <p:spTree>
+      <p:nvGrpSpPr>
+        <p:cNvPr id="1" name=""/>
+        <p:cNvGrpSpPr/>
+        <p:nvPr/>
+      </p:nvGrpSpPr>
+      <p:grpSpPr>
+        <a:xfrm>
+          <a:off x="0" y="0"/>
+          <a:ext cx="0" cy="0"/>
+          <a:chOff x="0" y="0"/>
+          <a:chExt cx="0" cy="0"/>
+        </a:xfrm>
+      </p:grpSpPr>
+      <p:sp>
+        <p:nvSpPr>
+          <p:cNvPr id="2" name="Slide Image Placeholder 1"/>
+          <p:cNvSpPr>
+            <a:spLocks noGrp="1" noRot="1" noChangeAspect="1"/>
+          </p:cNvSpPr>
+          <p:nvPr>
+            <p:ph type="sldImg"/>
+          </p:nvPr>
+        </p:nvSpPr>
+        <p:spPr/>
+      </p:sp>
+      <p:sp>
+        <p:nvSpPr>
+          <p:cNvPr id="3" name="Notes Placeholder 2"/>
+          <p:cNvSpPr>
+            <a:spLocks noGrp="1"/>
+          </p:cNvSpPr>
+          <p:nvPr>
+            <p:ph type="body" idx="1"/>
+          </p:nvPr>
+        </p:nvSpPr>
+        <p:spPr/>
+        <p:txBody>
+          <a:bodyPr/>
+          <a:lstStyle/>
+          <a:p>
+            <a:r>
+              <a:rPr lang="en-US" dirty="0" smtClean="0"/>
               <a:t>DEMO:</a:t>
             </a:r>
           </a:p>
@@ -1850,7 +1967,7 @@
             <a:fld id="{119C53A1-7820-2F4F-8D14-EDD3E312038F}" type="slidenum">
               <a:rPr lang="en-US" smtClean="0"/>
               <a:pPr/>
-              <a:t>14</a:t>
+              <a:t>18</a:t>
             </a:fld>
             <a:endParaRPr lang="en-US"/>
           </a:p>
@@ -2093,13 +2210,8 @@
             </a:r>
             <a:r>
               <a:rPr lang="en-US" baseline="0" dirty="0" smtClean="0"/>
-              <a:t> Phonegap docs </a:t>
-            </a:r>
-            <a:r>
-              <a:rPr lang="en-US" baseline="0" dirty="0" smtClean="0"/>
-              <a:t>website</a:t>
-            </a:r>
-            <a:endParaRPr lang="en-US" baseline="0" dirty="0" smtClean="0"/>
+              <a:t> Phonegap docs website</a:t>
+            </a:r>
           </a:p>
         </p:txBody>
       </p:sp>
@@ -2343,7 +2455,7 @@
             <a:fld id="{119C53A1-7820-2F4F-8D14-EDD3E312038F}" type="slidenum">
               <a:rPr lang="en-US" smtClean="0"/>
               <a:pPr/>
-              <a:t>6</a:t>
+              <a:t>7</a:t>
             </a:fld>
             <a:endParaRPr lang="en-US"/>
           </a:p>
@@ -2969,7 +3081,7 @@
             <a:fld id="{119C53A1-7820-2F4F-8D14-EDD3E312038F}" type="slidenum">
               <a:rPr lang="en-US" smtClean="0"/>
               <a:pPr/>
-              <a:t>7</a:t>
+              <a:t>8</a:t>
             </a:fld>
             <a:endParaRPr lang="en-US"/>
           </a:p>
@@ -3567,7 +3679,7 @@
             <a:fld id="{119C53A1-7820-2F4F-8D14-EDD3E312038F}" type="slidenum">
               <a:rPr lang="en-US" smtClean="0"/>
               <a:pPr/>
-              <a:t>8</a:t>
+              <a:t>9</a:t>
             </a:fld>
             <a:endParaRPr lang="en-US"/>
           </a:p>
@@ -3896,7 +4008,7 @@
             <a:fld id="{119C53A1-7820-2F4F-8D14-EDD3E312038F}" type="slidenum">
               <a:rPr lang="en-US" smtClean="0"/>
               <a:pPr/>
-              <a:t>9</a:t>
+              <a:t>10</a:t>
             </a:fld>
             <a:endParaRPr lang="en-US"/>
           </a:p>
@@ -8393,7 +8505,7 @@
           <a:p>
             <a:r>
               <a:rPr lang="en-US" dirty="0" smtClean="0"/>
-              <a:t>Data Binding with Knockout</a:t>
+              <a:t>Data Management</a:t>
             </a:r>
             <a:endParaRPr lang="en-US" dirty="0"/>
           </a:p>
@@ -8415,40 +8527,92 @@
           <a:lstStyle/>
           <a:p>
             <a:r>
-              <a:rPr lang="en-US" dirty="0"/>
-              <a:t>Easily associate DOM elements with model data using a concise, readable </a:t>
-            </a:r>
-            <a:r>
-              <a:rPr lang="en-US" dirty="0" smtClean="0"/>
-              <a:t>syntax</a:t>
-            </a:r>
-          </a:p>
-          <a:p>
-            <a:r>
-              <a:rPr lang="en-US" dirty="0" smtClean="0"/>
-              <a:t>UI updates automatically when data changes</a:t>
-            </a:r>
-          </a:p>
-          <a:p>
-            <a:r>
-              <a:rPr lang="en-US" dirty="0" smtClean="0"/>
-              <a:t>Easily map JSON data to data models</a:t>
-            </a:r>
-            <a:endParaRPr lang="en-US" dirty="0"/>
-          </a:p>
-          <a:p>
-            <a:r>
-              <a:rPr lang="en-US" dirty="0" smtClean="0"/>
+              <a:rPr lang="en-US" sz="2400" dirty="0" smtClean="0"/>
+              <a:t>Web SQL Database</a:t>
+            </a:r>
+          </a:p>
+          <a:p>
+            <a:pPr lvl="1"/>
+            <a:r>
+              <a:rPr lang="en-US" sz="2000" dirty="0" smtClean="0"/>
+              <a:t>Solves </a:t>
+            </a:r>
+            <a:r>
+              <a:rPr lang="en-US" sz="2000" smtClean="0"/>
+              <a:t>5 MB </a:t>
+            </a:r>
+            <a:r>
+              <a:rPr lang="en-US" sz="2000" dirty="0" smtClean="0"/>
+              <a:t>local storage limit</a:t>
+            </a:r>
+          </a:p>
+          <a:p>
+            <a:pPr lvl="1"/>
+            <a:r>
+              <a:rPr lang="en-US" sz="2000" dirty="0" smtClean="0"/>
+              <a:t>Broad mobile / desktop browser support</a:t>
+            </a:r>
+          </a:p>
+          <a:p>
+            <a:pPr lvl="1"/>
+            <a:r>
+              <a:rPr lang="en-US" sz="2000" dirty="0" smtClean="0"/>
+              <a:t>Based on SQLite</a:t>
+            </a:r>
+          </a:p>
+          <a:p>
+            <a:pPr lvl="1"/>
+            <a:r>
+              <a:rPr lang="en-US" sz="2000" dirty="0" smtClean="0"/>
+              <a:t>Databases can be preloaded and packaged with mobile app</a:t>
+            </a:r>
+          </a:p>
+          <a:p>
+            <a:pPr lvl="1"/>
+            <a:r>
+              <a:rPr lang="en-US" sz="2000" dirty="0"/>
+              <a:t>All queries execute asynchronously</a:t>
+            </a:r>
+          </a:p>
+          <a:p>
+            <a:pPr lvl="1"/>
+            <a:r>
+              <a:rPr lang="en-US" sz="2000" dirty="0" smtClean="0"/>
+              <a:t>All queries are transactional</a:t>
+            </a:r>
+          </a:p>
+          <a:p>
+            <a:pPr lvl="1"/>
+            <a:r>
+              <a:rPr lang="en-US" sz="2000" dirty="0" smtClean="0"/>
+              <a:t>GOTCHA? Deprecated by W3C</a:t>
+            </a:r>
+          </a:p>
+          <a:p>
+            <a:pPr lvl="2"/>
+            <a:r>
+              <a:rPr lang="en-US" sz="1600" dirty="0" smtClean="0"/>
+              <a:t>Why not IndexedDB?  Not supported by mobile browsers.</a:t>
+            </a:r>
+          </a:p>
+          <a:p>
+            <a:r>
+              <a:rPr lang="en-US" sz="2400" dirty="0" smtClean="0"/>
               <a:t>Demo</a:t>
             </a:r>
-            <a:endParaRPr lang="en-US" dirty="0"/>
+          </a:p>
+          <a:p>
+            <a:pPr marL="0" indent="0">
+              <a:buNone/>
+            </a:pPr>
+            <a:endParaRPr lang="en-US" sz="2400" dirty="0"/>
           </a:p>
         </p:txBody>
       </p:sp>
     </p:spTree>
     <p:extLst>
       <p:ext uri="{BB962C8B-B14F-4D97-AF65-F5344CB8AC3E}">
-        <p14:creationId xmlns:p14="http://schemas.microsoft.com/office/powerpoint/2010/main" val="3534183063"/>
+        <p14:creationId xmlns:p14="http://schemas.microsoft.com/office/powerpoint/2010/main" val="906434659"/>
       </p:ext>
     </p:extLst>
   </p:cSld>
@@ -8491,8 +8655,8 @@
           <a:lstStyle/>
           <a:p>
             <a:r>
-              <a:rPr lang="en-US" dirty="0" err="1" smtClean="0"/>
-              <a:t>Underscore.js</a:t>
+              <a:rPr lang="en-US" dirty="0" smtClean="0"/>
+              <a:t>Data Binding with Knockout</a:t>
             </a:r>
             <a:endParaRPr lang="en-US" dirty="0"/>
           </a:p>
@@ -8508,87 +8672,46 @@
             <p:ph idx="1"/>
           </p:nvPr>
         </p:nvSpPr>
-        <p:spPr>
-          <a:xfrm>
-            <a:off x="838200" y="2362200"/>
-            <a:ext cx="7693025" cy="4038600"/>
-          </a:xfrm>
-        </p:spPr>
+        <p:spPr/>
         <p:txBody>
           <a:bodyPr/>
           <a:lstStyle/>
           <a:p>
             <a:r>
-              <a:rPr lang="en-US" sz="2400" dirty="0" smtClean="0"/>
-              <a:t>The utility belt for JavaScript</a:t>
-            </a:r>
-          </a:p>
-          <a:p>
-            <a:r>
-              <a:rPr lang="en-US" sz="2400" dirty="0" smtClean="0"/>
-              <a:t>Provides 60-odd functions for:</a:t>
-            </a:r>
-          </a:p>
-          <a:p>
-            <a:pPr lvl="1"/>
-            <a:r>
-              <a:rPr lang="en-US" sz="2000" dirty="0" smtClean="0"/>
-              <a:t>Collections</a:t>
-            </a:r>
-          </a:p>
-          <a:p>
-            <a:pPr lvl="1"/>
-            <a:r>
-              <a:rPr lang="en-US" sz="2000" dirty="0" smtClean="0"/>
-              <a:t>Arrays</a:t>
-            </a:r>
-          </a:p>
-          <a:p>
-            <a:pPr lvl="1"/>
-            <a:r>
-              <a:rPr lang="en-US" sz="2000" dirty="0" smtClean="0"/>
-              <a:t>Objects</a:t>
-            </a:r>
-          </a:p>
-          <a:p>
-            <a:pPr lvl="1"/>
-            <a:r>
-              <a:rPr lang="en-US" sz="2000" dirty="0" smtClean="0"/>
-              <a:t>Functions</a:t>
-            </a:r>
-          </a:p>
-          <a:p>
-            <a:pPr lvl="1"/>
-            <a:r>
-              <a:rPr lang="en-US" sz="2000" dirty="0" smtClean="0"/>
-              <a:t>Equality testing</a:t>
-            </a:r>
-          </a:p>
-          <a:p>
-            <a:r>
-              <a:rPr lang="en-US" sz="2400" dirty="0" smtClean="0"/>
-              <a:t>Does not extend any built in JS objects</a:t>
-            </a:r>
-          </a:p>
-          <a:p>
-            <a:r>
-              <a:rPr lang="en-US" sz="2400" dirty="0" smtClean="0"/>
-              <a:t>Delegates to built-in JS functions if present</a:t>
-            </a:r>
-          </a:p>
-          <a:p>
-            <a:r>
-              <a:rPr lang="en-US" sz="2400" dirty="0" smtClean="0"/>
+              <a:rPr lang="en-US" dirty="0"/>
+              <a:t>Easily associate DOM elements with model data using a concise, readable </a:t>
+            </a:r>
+            <a:r>
+              <a:rPr lang="en-US" dirty="0" smtClean="0"/>
+              <a:t>syntax</a:t>
+            </a:r>
+          </a:p>
+          <a:p>
+            <a:r>
+              <a:rPr lang="en-US" dirty="0" smtClean="0"/>
+              <a:t>UI updates automatically when data changes</a:t>
+            </a:r>
+          </a:p>
+          <a:p>
+            <a:r>
+              <a:rPr lang="en-US" dirty="0" smtClean="0"/>
+              <a:t>Easily map JSON data to data models</a:t>
+            </a:r>
+            <a:endParaRPr lang="en-US" dirty="0"/>
+          </a:p>
+          <a:p>
+            <a:r>
+              <a:rPr lang="en-US" dirty="0" smtClean="0"/>
               <a:t>Demo</a:t>
             </a:r>
-            <a:endParaRPr lang="en-US" sz="2400" dirty="0"/>
+            <a:endParaRPr lang="en-US" dirty="0"/>
           </a:p>
         </p:txBody>
       </p:sp>
     </p:spTree>
     <p:extLst>
       <p:ext uri="{BB962C8B-B14F-4D97-AF65-F5344CB8AC3E}">
-        <p14:creationId xmlns:p14="http://schemas.microsoft.com/office/powerpoint/2010/main" val="623984035"/>
+        <p14:creationId xmlns:p14="http://schemas.microsoft.com/office/powerpoint/2010/main" val="3534183063"/>
       </p:ext>
     </p:extLst>
   </p:cSld>
@@ -8631,8 +8754,8 @@
           <a:lstStyle/>
           <a:p>
             <a:r>
-              <a:rPr lang="en-US" dirty="0" smtClean="0"/>
-              <a:t>HTML Templates via EJS</a:t>
+              <a:rPr lang="en-US" dirty="0" err="1" smtClean="0"/>
+              <a:t>Underscore.js</a:t>
             </a:r>
             <a:endParaRPr lang="en-US" dirty="0"/>
           </a:p>
@@ -8648,93 +8771,72 @@
             <p:ph idx="1"/>
           </p:nvPr>
         </p:nvSpPr>
-        <p:spPr/>
+        <p:spPr>
+          <a:xfrm>
+            <a:off x="838200" y="2362200"/>
+            <a:ext cx="7693025" cy="4038600"/>
+          </a:xfrm>
+        </p:spPr>
         <p:txBody>
           <a:bodyPr/>
           <a:lstStyle/>
           <a:p>
             <a:r>
               <a:rPr lang="en-US" sz="2400" dirty="0" smtClean="0"/>
-              <a:t>Cleans </a:t>
-            </a:r>
-            <a:r>
-              <a:rPr lang="en-US" sz="2400" dirty="0"/>
-              <a:t>the HTML out of your JavaScript with client side </a:t>
-            </a:r>
+              <a:t>The utility belt for JavaScript</a:t>
+            </a:r>
+          </a:p>
+          <a:p>
             <a:r>
               <a:rPr lang="en-US" sz="2400" dirty="0" smtClean="0"/>
-              <a:t>templates</a:t>
+              <a:t>Provides 60-odd functions for:</a:t>
+            </a:r>
+          </a:p>
+          <a:p>
+            <a:pPr lvl="1"/>
+            <a:r>
+              <a:rPr lang="en-US" sz="2000" dirty="0" smtClean="0"/>
+              <a:t>Collections</a:t>
+            </a:r>
+          </a:p>
+          <a:p>
+            <a:pPr lvl="1"/>
+            <a:r>
+              <a:rPr lang="en-US" sz="2000" dirty="0" smtClean="0"/>
+              <a:t>Arrays</a:t>
+            </a:r>
+          </a:p>
+          <a:p>
+            <a:pPr lvl="1"/>
+            <a:r>
+              <a:rPr lang="en-US" sz="2000" dirty="0" smtClean="0"/>
+              <a:t>Objects</a:t>
+            </a:r>
+          </a:p>
+          <a:p>
+            <a:pPr lvl="1"/>
+            <a:r>
+              <a:rPr lang="en-US" sz="2000" dirty="0" smtClean="0"/>
+              <a:t>Functions</a:t>
+            </a:r>
+          </a:p>
+          <a:p>
+            <a:pPr lvl="1"/>
+            <a:r>
+              <a:rPr lang="en-US" sz="2000" dirty="0" smtClean="0"/>
+              <a:t>Equality testing</a:t>
             </a:r>
           </a:p>
           <a:p>
             <a:r>
               <a:rPr lang="en-US" sz="2400" dirty="0" smtClean="0"/>
-              <a:t>Combines </a:t>
-            </a:r>
-            <a:r>
-              <a:rPr lang="en-US" sz="2400" dirty="0"/>
-              <a:t>data and a template to produce </a:t>
-            </a:r>
+              <a:t>Does not extend any built in JS objects</a:t>
+            </a:r>
+          </a:p>
+          <a:p>
             <a:r>
               <a:rPr lang="en-US" sz="2400" dirty="0" smtClean="0"/>
-              <a:t>HTML</a:t>
-            </a:r>
-          </a:p>
-          <a:p>
-            <a:r>
-              <a:rPr lang="en-US" sz="2400" dirty="0" smtClean="0"/>
-              <a:t>Templates can contain embedded JS</a:t>
-            </a:r>
-          </a:p>
-          <a:p>
-            <a:r>
-              <a:rPr lang="en-US" sz="2400" dirty="0" smtClean="0"/>
-              <a:t>Ideal </a:t>
-            </a:r>
-            <a:r>
-              <a:rPr lang="en-US" sz="2400" dirty="0"/>
-              <a:t>for creating reusable:</a:t>
-            </a:r>
-          </a:p>
-          <a:p>
-            <a:pPr lvl="1"/>
-            <a:r>
-              <a:rPr lang="en-US" sz="2000" dirty="0" smtClean="0"/>
-              <a:t>Headers </a:t>
-            </a:r>
-            <a:r>
-              <a:rPr lang="en-US" sz="2000" dirty="0"/>
-              <a:t>and </a:t>
-            </a:r>
-            <a:r>
-              <a:rPr lang="en-US" sz="2000" dirty="0" smtClean="0"/>
-              <a:t>footers</a:t>
-            </a:r>
-          </a:p>
-          <a:p>
-            <a:pPr lvl="1"/>
-            <a:r>
-              <a:rPr lang="en-US" sz="2000" dirty="0" smtClean="0"/>
-              <a:t>Complex </a:t>
-            </a:r>
-            <a:r>
-              <a:rPr lang="en-US" sz="2000" dirty="0"/>
-              <a:t>list items</a:t>
-            </a:r>
-          </a:p>
-          <a:p>
-            <a:pPr lvl="1"/>
-            <a:r>
-              <a:rPr lang="en-US" sz="2000" dirty="0" smtClean="0"/>
-              <a:t>Dialogs </a:t>
-            </a:r>
-            <a:r>
-              <a:rPr lang="en-US" sz="2000" dirty="0"/>
-              <a:t>(covered later in presentation</a:t>
-            </a:r>
-            <a:r>
-              <a:rPr lang="en-US" sz="2000" dirty="0" smtClean="0"/>
-              <a:t>)</a:t>
+              <a:t>Delegates to built-in JS functions if present</a:t>
             </a:r>
           </a:p>
           <a:p>
@@ -8742,13 +8844,14 @@
               <a:rPr lang="en-US" sz="2400" dirty="0" smtClean="0"/>
               <a:t>Demo</a:t>
             </a:r>
+            <a:endParaRPr lang="en-US" sz="2400" dirty="0"/>
           </a:p>
         </p:txBody>
       </p:sp>
     </p:spTree>
     <p:extLst>
       <p:ext uri="{BB962C8B-B14F-4D97-AF65-F5344CB8AC3E}">
-        <p14:creationId xmlns:p14="http://schemas.microsoft.com/office/powerpoint/2010/main" val="2440982678"/>
+        <p14:creationId xmlns:p14="http://schemas.microsoft.com/office/powerpoint/2010/main" val="623984035"/>
       </p:ext>
     </p:extLst>
   </p:cSld>
@@ -8792,7 +8895,7 @@
           <a:p>
             <a:r>
               <a:rPr lang="en-US" dirty="0" smtClean="0"/>
-              <a:t>Globalization</a:t>
+              <a:t>HTML Templates via EJS</a:t>
             </a:r>
             <a:endParaRPr lang="en-US" dirty="0"/>
           </a:p>
@@ -8814,51 +8917,94 @@
           <a:lstStyle/>
           <a:p>
             <a:r>
-              <a:rPr lang="en-US" dirty="0" err="1"/>
-              <a:t>jquery</a:t>
-            </a:r>
-            <a:r>
-              <a:rPr lang="en-US" dirty="0"/>
-              <a:t> / </a:t>
-            </a:r>
-            <a:r>
-              <a:rPr lang="en-US" dirty="0" smtClean="0"/>
-              <a:t>globalize</a:t>
-            </a:r>
-          </a:p>
-          <a:p>
-            <a:r>
-              <a:rPr lang="en-US" dirty="0" smtClean="0"/>
-              <a:t>Provides support for:</a:t>
+              <a:rPr lang="en-US" sz="2400" dirty="0" smtClean="0"/>
+              <a:t>Cleans </a:t>
+            </a:r>
+            <a:r>
+              <a:rPr lang="en-US" sz="2400" dirty="0"/>
+              <a:t>the HTML out of your JavaScript with client side </a:t>
+            </a:r>
+            <a:r>
+              <a:rPr lang="en-US" sz="2400" dirty="0" smtClean="0"/>
+              <a:t>templates</a:t>
+            </a:r>
+          </a:p>
+          <a:p>
+            <a:r>
+              <a:rPr lang="en-US" sz="2400" dirty="0" smtClean="0"/>
+              <a:t>Combines </a:t>
+            </a:r>
+            <a:r>
+              <a:rPr lang="en-US" sz="2400" dirty="0"/>
+              <a:t>data and a template to produce </a:t>
+            </a:r>
+            <a:r>
+              <a:rPr lang="en-US" sz="2400" dirty="0" smtClean="0"/>
+              <a:t>HTML</a:t>
+            </a:r>
+          </a:p>
+          <a:p>
+            <a:r>
+              <a:rPr lang="en-US" sz="2400" dirty="0" smtClean="0"/>
+              <a:t>Templates can contain embedded JS</a:t>
+            </a:r>
+          </a:p>
+          <a:p>
+            <a:r>
+              <a:rPr lang="en-US" sz="2400" dirty="0" smtClean="0"/>
+              <a:t>Ideal </a:t>
+            </a:r>
+            <a:r>
+              <a:rPr lang="en-US" sz="2400" dirty="0"/>
+              <a:t>for creating reusable:</a:t>
             </a:r>
           </a:p>
           <a:p>
             <a:pPr lvl="1"/>
             <a:r>
-              <a:rPr lang="en-US" dirty="0" smtClean="0"/>
-              <a:t>Localized text</a:t>
+              <a:rPr lang="en-US" sz="2000" dirty="0" smtClean="0"/>
+              <a:t>Headers </a:t>
+            </a:r>
+            <a:r>
+              <a:rPr lang="en-US" sz="2000" dirty="0"/>
+              <a:t>and </a:t>
+            </a:r>
+            <a:r>
+              <a:rPr lang="en-US" sz="2000" dirty="0" smtClean="0"/>
+              <a:t>footers</a:t>
             </a:r>
           </a:p>
           <a:p>
             <a:pPr lvl="1"/>
             <a:r>
-              <a:rPr lang="en-US" dirty="0" smtClean="0"/>
-              <a:t>Number and date formatting</a:t>
-            </a:r>
-          </a:p>
-          <a:p>
-            <a:r>
-              <a:rPr lang="en-US" dirty="0" smtClean="0"/>
+              <a:rPr lang="en-US" sz="2000" dirty="0" smtClean="0"/>
+              <a:t>Complex </a:t>
+            </a:r>
+            <a:r>
+              <a:rPr lang="en-US" sz="2000" dirty="0"/>
+              <a:t>list items</a:t>
+            </a:r>
+          </a:p>
+          <a:p>
+            <a:pPr lvl="1"/>
+            <a:r>
+              <a:rPr lang="en-US" sz="2000" dirty="0" smtClean="0"/>
+              <a:t>Dialogs</a:t>
+            </a:r>
+            <a:endParaRPr lang="en-US" sz="2000" dirty="0" smtClean="0"/>
+          </a:p>
+          <a:p>
+            <a:r>
+              <a:rPr lang="en-US" sz="2400" dirty="0" smtClean="0"/>
               <a:t>Demo</a:t>
             </a:r>
-            <a:endParaRPr lang="en-US" dirty="0"/>
           </a:p>
         </p:txBody>
       </p:sp>
     </p:spTree>
     <p:extLst>
       <p:ext uri="{BB962C8B-B14F-4D97-AF65-F5344CB8AC3E}">
-        <p14:creationId xmlns:p14="http://schemas.microsoft.com/office/powerpoint/2010/main" val="12541195"/>
+        <p14:creationId xmlns:p14="http://schemas.microsoft.com/office/powerpoint/2010/main" val="2440982678"/>
       </p:ext>
     </p:extLst>
   </p:cSld>
@@ -8902,7 +9048,7 @@
           <a:p>
             <a:r>
               <a:rPr lang="en-US" dirty="0" smtClean="0"/>
-              <a:t>Useful Add-ons</a:t>
+              <a:t>Globalization</a:t>
             </a:r>
             <a:endParaRPr lang="en-US" dirty="0"/>
           </a:p>
@@ -8924,140 +9070,52 @@
           <a:lstStyle/>
           <a:p>
             <a:r>
+              <a:rPr lang="en-US" dirty="0" err="1"/>
+              <a:t>jquery</a:t>
+            </a:r>
+            <a:r>
+              <a:rPr lang="en-US" dirty="0"/>
+              <a:t> / </a:t>
+            </a:r>
+            <a:r>
               <a:rPr lang="en-US" dirty="0" smtClean="0"/>
-              <a:t>SimpleDialog2</a:t>
+              <a:t>globalize + jquery-i18n</a:t>
+            </a:r>
+            <a:endParaRPr lang="en-US" dirty="0" smtClean="0"/>
+          </a:p>
+          <a:p>
+            <a:r>
+              <a:rPr lang="en-US" dirty="0" smtClean="0"/>
+              <a:t>Provides support for:</a:t>
             </a:r>
           </a:p>
           <a:p>
             <a:pPr lvl="1"/>
             <a:r>
-              <a:rPr lang="en-US" sz="2000" dirty="0"/>
-              <a:t>http://</a:t>
-            </a:r>
-            <a:r>
-              <a:rPr lang="en-US" sz="2000" dirty="0" err="1"/>
-              <a:t>dev.jtsage.com</a:t>
-            </a:r>
-            <a:r>
-              <a:rPr lang="en-US" sz="2000" dirty="0"/>
-              <a:t>/</a:t>
-            </a:r>
-            <a:r>
-              <a:rPr lang="en-US" sz="2000" dirty="0" err="1"/>
-              <a:t>jQM-SimpleDialog</a:t>
-            </a:r>
-            <a:r>
-              <a:rPr lang="en-US" sz="2000" dirty="0"/>
-              <a:t>/demos2</a:t>
-            </a:r>
-            <a:r>
-              <a:rPr lang="en-US" sz="2000" dirty="0" smtClean="0"/>
-              <a:t>/</a:t>
-            </a:r>
-          </a:p>
-          <a:p>
-            <a:r>
-              <a:rPr lang="en-US" dirty="0" err="1" smtClean="0"/>
-              <a:t>DateBox</a:t>
-            </a:r>
-            <a:endParaRPr lang="en-US" dirty="0" smtClean="0"/>
+              <a:rPr lang="en-US" dirty="0" smtClean="0"/>
+              <a:t>Localized text</a:t>
+            </a:r>
           </a:p>
           <a:p>
             <a:pPr lvl="1"/>
             <a:r>
-              <a:rPr lang="en-US" sz="2000" dirty="0"/>
-              <a:t>http://</a:t>
-            </a:r>
-            <a:r>
-              <a:rPr lang="en-US" sz="2000" dirty="0" err="1"/>
-              <a:t>dev.jtsage.com</a:t>
-            </a:r>
-            <a:r>
-              <a:rPr lang="en-US" sz="2000" dirty="0"/>
-              <a:t>/</a:t>
-            </a:r>
-            <a:r>
-              <a:rPr lang="en-US" sz="2000" dirty="0" err="1"/>
-              <a:t>jQM-DateBox</a:t>
-            </a:r>
-            <a:r>
-              <a:rPr lang="en-US" sz="2000" dirty="0" smtClean="0"/>
-              <a:t>/</a:t>
-            </a:r>
-          </a:p>
-          <a:p>
-            <a:r>
               <a:rPr lang="en-US" dirty="0" smtClean="0"/>
-              <a:t>jQuery </a:t>
-            </a:r>
-            <a:r>
-              <a:rPr lang="en-US" dirty="0" err="1" smtClean="0"/>
-              <a:t>doTimeout</a:t>
-            </a:r>
-            <a:endParaRPr lang="en-US" dirty="0" smtClean="0"/>
-          </a:p>
-          <a:p>
-            <a:pPr lvl="1"/>
-            <a:r>
-              <a:rPr lang="en-US" sz="2000" dirty="0"/>
-              <a:t>http://</a:t>
-            </a:r>
-            <a:r>
-              <a:rPr lang="en-US" sz="2000" dirty="0" err="1"/>
-              <a:t>benalman.com</a:t>
-            </a:r>
-            <a:r>
-              <a:rPr lang="en-US" sz="2000" dirty="0"/>
-              <a:t>/projects/</a:t>
-            </a:r>
-            <a:r>
-              <a:rPr lang="en-US" sz="2000" dirty="0" err="1"/>
-              <a:t>jquery</a:t>
-            </a:r>
-            <a:r>
-              <a:rPr lang="en-US" sz="2000" dirty="0"/>
-              <a:t>-</a:t>
-            </a:r>
-            <a:r>
-              <a:rPr lang="en-US" sz="2000" dirty="0" err="1"/>
-              <a:t>dotimeout</a:t>
-            </a:r>
-            <a:r>
-              <a:rPr lang="en-US" sz="2000" dirty="0"/>
-              <a:t>-plugin/</a:t>
+              <a:t>Number and date formatting</a:t>
             </a:r>
           </a:p>
           <a:p>
             <a:r>
               <a:rPr lang="en-US" dirty="0" smtClean="0"/>
-              <a:t>Signature Pad</a:t>
-            </a:r>
-          </a:p>
-          <a:p>
-            <a:pPr lvl="1"/>
-            <a:r>
-              <a:rPr lang="en-US" sz="2000" dirty="0"/>
-              <a:t>http://</a:t>
-            </a:r>
-            <a:r>
-              <a:rPr lang="en-US" sz="2000" dirty="0" err="1"/>
-              <a:t>thomasjbradley.ca</a:t>
-            </a:r>
-            <a:r>
-              <a:rPr lang="en-US" sz="2000" dirty="0"/>
-              <a:t>/lab/signature-pad</a:t>
-            </a:r>
-            <a:r>
-              <a:rPr lang="en-US" sz="2000" dirty="0" smtClean="0"/>
-              <a:t>/</a:t>
-            </a:r>
+              <a:t>Demo</a:t>
+            </a:r>
+            <a:endParaRPr lang="en-US" dirty="0"/>
           </a:p>
         </p:txBody>
       </p:sp>
     </p:spTree>
     <p:extLst>
       <p:ext uri="{BB962C8B-B14F-4D97-AF65-F5344CB8AC3E}">
-        <p14:creationId xmlns:p14="http://schemas.microsoft.com/office/powerpoint/2010/main" val="2911465124"/>
+        <p14:creationId xmlns:p14="http://schemas.microsoft.com/office/powerpoint/2010/main" val="12541195"/>
       </p:ext>
     </p:extLst>
   </p:cSld>
@@ -9086,7 +9144,7 @@
       </p:grpSpPr>
       <p:sp>
         <p:nvSpPr>
-          <p:cNvPr id="4" name="Title 3"/>
+          <p:cNvPr id="2" name="Title 1"/>
           <p:cNvSpPr>
             <a:spLocks noGrp="1"/>
           </p:cNvSpPr>
@@ -9101,7 +9159,7 @@
           <a:p>
             <a:r>
               <a:rPr lang="en-US" dirty="0" smtClean="0"/>
-              <a:t>Links</a:t>
+              <a:t>Lessons Learned and Gotcha’s</a:t>
             </a:r>
             <a:endParaRPr lang="en-US" dirty="0"/>
           </a:p>
@@ -9109,18 +9167,18 @@
       </p:sp>
       <p:sp>
         <p:nvSpPr>
-          <p:cNvPr id="5" name="Content Placeholder 4"/>
+          <p:cNvPr id="3" name="Content Placeholder 2"/>
           <p:cNvSpPr>
             <a:spLocks noGrp="1"/>
           </p:cNvSpPr>
           <p:nvPr>
-            <p:ph sz="half" idx="1"/>
+            <p:ph idx="1"/>
           </p:nvPr>
         </p:nvSpPr>
         <p:spPr>
           <a:xfrm>
             <a:off x="838200" y="2362200"/>
-            <a:ext cx="7848600" cy="3724275"/>
+            <a:ext cx="7693025" cy="3724275"/>
           </a:xfrm>
         </p:spPr>
         <p:txBody>
@@ -9128,56 +9186,36 @@
           <a:lstStyle/>
           <a:p>
             <a:r>
+              <a:rPr lang="en-US" sz="2000" dirty="0" smtClean="0"/>
+              <a:t>Upgrading libraries</a:t>
+            </a:r>
+          </a:p>
+          <a:p>
+            <a:pPr lvl="1"/>
+            <a:r>
               <a:rPr lang="en-US" sz="1800" dirty="0" smtClean="0"/>
-              <a:t>JavaScript: The Good Parts</a:t>
+              <a:t>Be careful!</a:t>
             </a:r>
           </a:p>
           <a:p>
             <a:pPr lvl="1"/>
             <a:r>
-              <a:rPr lang="en-US" sz="1400" dirty="0"/>
-              <a:t>http://</a:t>
-            </a:r>
-            <a:r>
-              <a:rPr lang="en-US" sz="1400" dirty="0" err="1"/>
-              <a:t>www.amazon.com</a:t>
-            </a:r>
-            <a:r>
-              <a:rPr lang="en-US" sz="1400" dirty="0"/>
-              <a:t>/JavaScript-Good-Parts-Douglas-</a:t>
-            </a:r>
-            <a:r>
-              <a:rPr lang="en-US" sz="1400" dirty="0" err="1"/>
-              <a:t>Crockford</a:t>
-            </a:r>
-            <a:r>
-              <a:rPr lang="en-US" sz="1400" dirty="0"/>
-              <a:t>/</a:t>
-            </a:r>
-            <a:r>
-              <a:rPr lang="en-US" sz="1400" dirty="0" err="1"/>
-              <a:t>dp</a:t>
-            </a:r>
-            <a:r>
-              <a:rPr lang="en-US" sz="1400" dirty="0"/>
-              <a:t>/0596517742</a:t>
-            </a:r>
-          </a:p>
-          <a:p>
-            <a:r>
               <a:rPr lang="en-US" sz="1800" dirty="0" smtClean="0"/>
-              <a:t>Phonegap</a:t>
-            </a:r>
-            <a:r>
-              <a:rPr lang="en-US" sz="1800" dirty="0"/>
-              <a:t>:</a:t>
-            </a:r>
-          </a:p>
-          <a:p>
-            <a:pPr lvl="1"/>
+              <a:t>Phonegap:</a:t>
+            </a:r>
+          </a:p>
+          <a:p>
+            <a:pPr lvl="2"/>
+            <a:r>
+              <a:rPr lang="en-US" sz="1600" dirty="0" smtClean="0"/>
+              <a:t>API changes / plugin changes</a:t>
+            </a:r>
+          </a:p>
+          <a:p>
+            <a:pPr lvl="2"/>
             <a:r>
               <a:rPr lang="en-US" sz="1600" dirty="0"/>
-              <a:t>http://</a:t>
+              <a:t>See http://</a:t>
             </a:r>
             <a:r>
               <a:rPr lang="en-US" sz="1600" dirty="0" err="1"/>
@@ -9185,147 +9223,49 @@
             </a:r>
             <a:r>
               <a:rPr lang="en-US" sz="1600" dirty="0"/>
-              <a:t>/en/</a:t>
+              <a:t>/en/2.6.0/</a:t>
             </a:r>
             <a:r>
               <a:rPr lang="en-US" sz="1600" dirty="0" smtClean="0"/>
-              <a:t>2.1.0</a:t>
+              <a:t>guide_upgrading_index.md.html</a:t>
             </a:r>
             <a:r>
               <a:rPr lang="en-US" sz="1600" dirty="0"/>
-              <a:t>/</a:t>
-            </a:r>
-            <a:r>
-              <a:rPr lang="en-US" sz="1600" dirty="0" err="1"/>
-              <a:t>index.html</a:t>
-            </a:r>
-            <a:endParaRPr lang="en-US" sz="1600" dirty="0"/>
-          </a:p>
-          <a:p>
-            <a:r>
-              <a:rPr lang="en-US" sz="1800" dirty="0"/>
-              <a:t>jQuery Mobile</a:t>
-            </a:r>
-            <a:r>
-              <a:rPr lang="en-US" sz="1800" dirty="0" smtClean="0"/>
-              <a:t>:</a:t>
-            </a:r>
-          </a:p>
-          <a:p>
-            <a:pPr lvl="1"/>
-            <a:r>
-              <a:rPr lang="en-US" sz="1600" dirty="0"/>
-              <a:t>http://</a:t>
-            </a:r>
-            <a:r>
-              <a:rPr lang="en-US" sz="1600" dirty="0" err="1"/>
-              <a:t>jquerymobile.com</a:t>
-            </a:r>
-            <a:r>
-              <a:rPr lang="en-US" sz="1600" dirty="0"/>
-              <a:t>/demos/1.1.1/</a:t>
-            </a:r>
-          </a:p>
-          <a:p>
-            <a:r>
-              <a:rPr lang="en-US" sz="1800" dirty="0" smtClean="0"/>
-              <a:t>W3C</a:t>
-            </a:r>
-            <a:endParaRPr lang="en-US" sz="1800" dirty="0"/>
-          </a:p>
-          <a:p>
-            <a:pPr lvl="1"/>
-            <a:r>
-              <a:rPr lang="en-US" sz="1600" dirty="0"/>
-              <a:t>Web Storage: http://www.w3.org/TR/</a:t>
-            </a:r>
-            <a:r>
-              <a:rPr lang="en-US" sz="1600" dirty="0" err="1"/>
-              <a:t>webstorage</a:t>
-            </a:r>
-            <a:r>
-              <a:rPr lang="en-US" sz="1600" dirty="0"/>
-              <a:t>/</a:t>
-            </a:r>
-          </a:p>
-          <a:p>
-            <a:pPr lvl="1"/>
+              <a:t>#Upgrading%</a:t>
+            </a:r>
             <a:r>
               <a:rPr lang="en-US" sz="1600" dirty="0" smtClean="0"/>
-              <a:t>Web </a:t>
-            </a:r>
-            <a:r>
-              <a:rPr lang="en-US" sz="1600" dirty="0"/>
-              <a:t>SQL Database: http://www.w3.org/TR/</a:t>
-            </a:r>
-            <a:r>
-              <a:rPr lang="en-US" sz="1600" dirty="0" err="1"/>
-              <a:t>webdatabase</a:t>
-            </a:r>
-            <a:r>
-              <a:rPr lang="en-US" sz="1600" dirty="0"/>
-              <a:t>/</a:t>
-            </a:r>
-          </a:p>
-          <a:p>
-            <a:r>
-              <a:rPr lang="en-US" sz="1800" dirty="0" smtClean="0"/>
-              <a:t>Knockout</a:t>
-            </a:r>
-            <a:endParaRPr lang="en-US" sz="1800" dirty="0"/>
-          </a:p>
-          <a:p>
-            <a:pPr lvl="1"/>
-            <a:r>
-              <a:rPr lang="en-US" sz="1600" dirty="0"/>
-              <a:t>http://</a:t>
-            </a:r>
-            <a:r>
-              <a:rPr lang="en-US" sz="1600" dirty="0" err="1"/>
-              <a:t>knockoutjs.com</a:t>
-            </a:r>
-            <a:r>
-              <a:rPr lang="en-US" sz="1600" dirty="0"/>
-              <a:t>/documentation/</a:t>
-            </a:r>
-            <a:r>
-              <a:rPr lang="en-US" sz="1600" dirty="0" err="1"/>
-              <a:t>introduction.html</a:t>
-            </a:r>
-            <a:endParaRPr lang="en-US" sz="1600" dirty="0"/>
-          </a:p>
-          <a:p>
-            <a:pPr lvl="1"/>
-            <a:r>
-              <a:rPr lang="en-US" sz="1600" dirty="0"/>
-              <a:t>http://</a:t>
-            </a:r>
-            <a:r>
-              <a:rPr lang="en-US" sz="1600" dirty="0" err="1"/>
-              <a:t>knockoutjs.com</a:t>
-            </a:r>
-            <a:r>
-              <a:rPr lang="en-US" sz="1600" dirty="0"/>
-              <a:t>/documentation/plugins-</a:t>
-            </a:r>
-            <a:r>
-              <a:rPr lang="en-US" sz="1600" dirty="0" err="1"/>
-              <a:t>mapping.html</a:t>
-            </a:r>
-            <a:endParaRPr lang="en-US" sz="1600" dirty="0"/>
+              <a:t>20Guides</a:t>
+            </a:r>
+          </a:p>
+          <a:p>
+            <a:r>
+              <a:rPr lang="en-US" sz="2000" dirty="0" smtClean="0"/>
+              <a:t>Android emulator is too slow to be useful</a:t>
+            </a:r>
+          </a:p>
+          <a:p>
+            <a:r>
+              <a:rPr lang="en-US" sz="2000" dirty="0" smtClean="0"/>
+              <a:t>Deployment to real iOS device requires Apple iOS Developer membership</a:t>
+            </a:r>
+            <a:endParaRPr lang="en-US" sz="1800" dirty="0" smtClean="0"/>
+          </a:p>
+          <a:p>
+            <a:endParaRPr lang="en-US" sz="2000" dirty="0" smtClean="0"/>
           </a:p>
           <a:p>
             <a:pPr marL="0" indent="0">
               <a:buNone/>
             </a:pPr>
-            <a:endParaRPr lang="en-US" sz="4000" dirty="0"/>
+            <a:endParaRPr lang="en-US" sz="2000" dirty="0"/>
           </a:p>
         </p:txBody>
       </p:sp>
     </p:spTree>
     <p:extLst>
       <p:ext uri="{BB962C8B-B14F-4D97-AF65-F5344CB8AC3E}">
-        <p14:creationId xmlns:p14="http://schemas.microsoft.com/office/powerpoint/2010/main" val="2432929412"/>
+        <p14:creationId xmlns:p14="http://schemas.microsoft.com/office/powerpoint/2010/main" val="742550030"/>
       </p:ext>
     </p:extLst>
   </p:cSld>
@@ -9369,7 +9309,7 @@
           <a:p>
             <a:r>
               <a:rPr lang="en-US" dirty="0" smtClean="0"/>
-              <a:t>More Links</a:t>
+              <a:t>Performance / Devices / Browsers</a:t>
             </a:r>
             <a:endParaRPr lang="en-US" dirty="0"/>
           </a:p>
@@ -9385,168 +9325,136 @@
             <p:ph idx="1"/>
           </p:nvPr>
         </p:nvSpPr>
-        <p:spPr/>
+        <p:spPr>
+          <a:xfrm>
+            <a:off x="838200" y="2286000"/>
+            <a:ext cx="7693025" cy="3724275"/>
+          </a:xfrm>
+        </p:spPr>
         <p:txBody>
           <a:bodyPr/>
           <a:lstStyle/>
           <a:p>
             <a:r>
-              <a:rPr lang="en-US" sz="2000" dirty="0" err="1" smtClean="0"/>
-              <a:t>Underscore.js</a:t>
-            </a:r>
-            <a:r>
-              <a:rPr lang="en-US" sz="2000" dirty="0" smtClean="0"/>
-              <a:t>:</a:t>
+              <a:rPr lang="en-US" sz="1600" dirty="0" smtClean="0"/>
+              <a:t>Performance</a:t>
             </a:r>
           </a:p>
           <a:p>
             <a:pPr lvl="1"/>
             <a:r>
-              <a:rPr lang="en-US" sz="1800" dirty="0" smtClean="0"/>
-              <a:t>http</a:t>
-            </a:r>
-            <a:r>
-              <a:rPr lang="en-US" sz="1800" dirty="0"/>
-              <a:t>://</a:t>
-            </a:r>
-            <a:r>
-              <a:rPr lang="en-US" sz="1800" dirty="0" err="1"/>
-              <a:t>documentcloud.github.com</a:t>
-            </a:r>
-            <a:r>
-              <a:rPr lang="en-US" sz="1800" dirty="0"/>
-              <a:t>/underscore/</a:t>
-            </a:r>
-          </a:p>
-          <a:p>
-            <a:r>
-              <a:rPr lang="en-US" sz="2000" dirty="0" smtClean="0"/>
-              <a:t>EJS:</a:t>
+              <a:rPr lang="en-US" sz="1400" dirty="0" smtClean="0"/>
+              <a:t>Depends on device and OS</a:t>
             </a:r>
           </a:p>
           <a:p>
             <a:pPr lvl="1"/>
             <a:r>
-              <a:rPr lang="en-US" sz="1800" dirty="0" smtClean="0"/>
-              <a:t>http</a:t>
-            </a:r>
-            <a:r>
-              <a:rPr lang="en-US" sz="1800" dirty="0"/>
-              <a:t>://</a:t>
-            </a:r>
-            <a:r>
-              <a:rPr lang="en-US" sz="1800" dirty="0" err="1"/>
-              <a:t>embeddedjs.com</a:t>
-            </a:r>
-            <a:r>
-              <a:rPr lang="en-US" sz="1800" dirty="0"/>
-              <a:t>/</a:t>
-            </a:r>
-          </a:p>
-          <a:p>
-            <a:r>
-              <a:rPr lang="en-US" sz="2000" dirty="0" err="1" smtClean="0"/>
-              <a:t>jquery</a:t>
-            </a:r>
-            <a:r>
-              <a:rPr lang="en-US" sz="2000" dirty="0" smtClean="0"/>
-              <a:t> </a:t>
-            </a:r>
-            <a:r>
-              <a:rPr lang="en-US" sz="2000" dirty="0"/>
-              <a:t>/ </a:t>
-            </a:r>
-            <a:r>
-              <a:rPr lang="en-US" sz="2000" dirty="0" smtClean="0"/>
-              <a:t>globalize:</a:t>
+              <a:rPr lang="en-US" sz="1400" dirty="0" err="1" smtClean="0"/>
+              <a:t>iOS</a:t>
+            </a:r>
+            <a:r>
+              <a:rPr lang="en-US" sz="1400" dirty="0" smtClean="0"/>
+              <a:t> generally faster than Android</a:t>
             </a:r>
           </a:p>
           <a:p>
             <a:pPr lvl="1"/>
             <a:r>
-              <a:rPr lang="en-US" sz="1800" dirty="0" smtClean="0"/>
-              <a:t>https</a:t>
-            </a:r>
-            <a:r>
-              <a:rPr lang="en-US" sz="1800" dirty="0"/>
-              <a:t>://</a:t>
-            </a:r>
-            <a:r>
-              <a:rPr lang="en-US" sz="1800" dirty="0" err="1"/>
-              <a:t>github.com</a:t>
-            </a:r>
-            <a:r>
-              <a:rPr lang="en-US" sz="1800" dirty="0"/>
-              <a:t>/</a:t>
-            </a:r>
-            <a:r>
-              <a:rPr lang="en-US" sz="1800" dirty="0" err="1"/>
-              <a:t>jquery</a:t>
-            </a:r>
-            <a:r>
-              <a:rPr lang="en-US" sz="1800" dirty="0"/>
-              <a:t>/globalize</a:t>
-            </a:r>
-          </a:p>
-          <a:p>
-            <a:r>
-              <a:rPr lang="en-US" sz="2000" dirty="0" smtClean="0"/>
-              <a:t>JSON Validator:</a:t>
+              <a:rPr lang="en-US" sz="1400" dirty="0" smtClean="0"/>
+              <a:t>Later Android versions generally faster than earlier versions</a:t>
+            </a:r>
+          </a:p>
+          <a:p>
+            <a:pPr lvl="2"/>
+            <a:r>
+              <a:rPr lang="en-US" sz="1200" dirty="0" smtClean="0"/>
+              <a:t>Recommend Ice Cream Sandwich as absolute minimum</a:t>
+            </a:r>
+          </a:p>
+          <a:p>
+            <a:r>
+              <a:rPr lang="en-US" sz="1600" dirty="0" smtClean="0"/>
+              <a:t>Device differences</a:t>
             </a:r>
           </a:p>
           <a:p>
             <a:pPr lvl="1"/>
             <a:r>
-              <a:rPr lang="en-US" sz="1800" dirty="0" smtClean="0"/>
-              <a:t>http</a:t>
-            </a:r>
-            <a:r>
-              <a:rPr lang="en-US" sz="1800" dirty="0"/>
-              <a:t>://</a:t>
-            </a:r>
-            <a:r>
-              <a:rPr lang="en-US" sz="1800" dirty="0" err="1"/>
-              <a:t>jsonlint.com</a:t>
-            </a:r>
-            <a:r>
-              <a:rPr lang="en-US" sz="1800" dirty="0" smtClean="0"/>
-              <a:t>/</a:t>
-            </a:r>
-          </a:p>
-          <a:p>
-            <a:r>
-              <a:rPr lang="en-US" sz="2200" dirty="0" err="1" smtClean="0"/>
-              <a:t>jsFiddle</a:t>
-            </a:r>
-            <a:endParaRPr lang="en-US" sz="2200" dirty="0" smtClean="0"/>
+              <a:rPr lang="en-US" sz="1200" dirty="0" smtClean="0"/>
+              <a:t>Screen resolutions and screen rotation</a:t>
+            </a:r>
           </a:p>
           <a:p>
             <a:pPr lvl="1"/>
             <a:r>
-              <a:rPr lang="en-US" sz="1800" dirty="0"/>
-              <a:t>http://</a:t>
-            </a:r>
-            <a:r>
-              <a:rPr lang="en-US" sz="1800" dirty="0" err="1"/>
-              <a:t>jsfiddle.net</a:t>
-            </a:r>
-            <a:r>
-              <a:rPr lang="en-US" sz="1800" dirty="0"/>
-              <a:t>/</a:t>
-            </a:r>
-          </a:p>
-          <a:p>
-            <a:endParaRPr lang="en-US" sz="2000" dirty="0"/>
-          </a:p>
-          <a:p>
-            <a:endParaRPr lang="en-US" sz="2000" dirty="0"/>
+              <a:rPr lang="en-US" sz="1200" dirty="0" smtClean="0"/>
+              <a:t>Device independence != screen resolution independence</a:t>
+            </a:r>
+          </a:p>
+          <a:p>
+            <a:pPr lvl="1"/>
+            <a:r>
+              <a:rPr lang="en-US" sz="1200" dirty="0" smtClean="0"/>
+              <a:t>Vendor changes to Android browser – Ex: Samsung Galaxy Tab 2 10.1</a:t>
+            </a:r>
+          </a:p>
+          <a:p>
+            <a:r>
+              <a:rPr lang="en-US" sz="1600" dirty="0"/>
+              <a:t>Minifying JS files not necessary</a:t>
+            </a:r>
+          </a:p>
+          <a:p>
+            <a:pPr lvl="1"/>
+            <a:r>
+              <a:rPr lang="en-US" sz="1200" dirty="0"/>
+              <a:t>Offers insignificant load time improvement</a:t>
+            </a:r>
+            <a:endParaRPr lang="en-US" sz="1800" dirty="0"/>
+          </a:p>
+          <a:p>
+            <a:r>
+              <a:rPr lang="en-US" sz="1600" dirty="0" smtClean="0"/>
+              <a:t>Browser Anomalies</a:t>
+            </a:r>
+          </a:p>
+          <a:p>
+            <a:pPr lvl="1"/>
+            <a:r>
+              <a:rPr lang="en-US" sz="1200" dirty="0" smtClean="0"/>
+              <a:t>Don’t assume that what works on desktop browser will just work on device</a:t>
+            </a:r>
+            <a:r>
+              <a:rPr lang="en-US" sz="1200" dirty="0" smtClean="0"/>
+              <a:t>.</a:t>
+            </a:r>
+          </a:p>
+          <a:p>
+            <a:pPr lvl="1"/>
+            <a:r>
+              <a:rPr lang="en-US" sz="1200" dirty="0" smtClean="0"/>
+              <a:t>Don’t assume that what works on one Android device will just work on another.</a:t>
+            </a:r>
+            <a:endParaRPr lang="en-US" sz="1200" dirty="0" smtClean="0"/>
+          </a:p>
+          <a:p>
+            <a:pPr lvl="1"/>
+            <a:r>
+              <a:rPr lang="en-US" sz="1200" dirty="0" smtClean="0"/>
+              <a:t>Test, test, test…</a:t>
+            </a:r>
+          </a:p>
+          <a:p>
+            <a:pPr lvl="1"/>
+            <a:endParaRPr lang="en-US" sz="1400" dirty="0"/>
           </a:p>
         </p:txBody>
       </p:sp>
     </p:spTree>
     <p:extLst>
       <p:ext uri="{BB962C8B-B14F-4D97-AF65-F5344CB8AC3E}">
-        <p14:creationId xmlns:p14="http://schemas.microsoft.com/office/powerpoint/2010/main" val="3712984815"/>
+        <p14:creationId xmlns:p14="http://schemas.microsoft.com/office/powerpoint/2010/main" val="92143585"/>
       </p:ext>
     </p:extLst>
   </p:cSld>
@@ -9590,7 +9498,7 @@
           <a:p>
             <a:r>
               <a:rPr lang="en-US" dirty="0" smtClean="0"/>
-              <a:t>Questions</a:t>
+              <a:t>Debugging</a:t>
             </a:r>
             <a:endParaRPr lang="en-US" dirty="0"/>
           </a:p>
@@ -9612,49 +9520,485 @@
           <a:lstStyle/>
           <a:p>
             <a:r>
-              <a:rPr lang="en-US" dirty="0"/>
-              <a:t>My contact info:</a:t>
+              <a:rPr lang="en-US" sz="2400" dirty="0" smtClean="0"/>
+              <a:t>Source level JS debugging on desktop only</a:t>
             </a:r>
           </a:p>
           <a:p>
             <a:pPr lvl="1"/>
             <a:r>
-              <a:rPr lang="en-US" dirty="0" err="1"/>
-              <a:t>keith.wedinger@</a:t>
-            </a:r>
-            <a:r>
-              <a:rPr lang="en-US" dirty="0" err="1" smtClean="0"/>
-              <a:t>leadingedje.com</a:t>
-            </a:r>
-            <a:endParaRPr lang="en-US" dirty="0" smtClean="0"/>
+              <a:rPr lang="en-US" sz="2000" dirty="0" smtClean="0"/>
+              <a:t>Use WebKit browser like Chrome or Safari</a:t>
+            </a:r>
           </a:p>
           <a:p>
             <a:pPr lvl="1"/>
             <a:r>
-              <a:rPr lang="en-US" dirty="0"/>
-              <a:t>http://</a:t>
-            </a:r>
-            <a:r>
-              <a:rPr lang="en-US" dirty="0" err="1"/>
-              <a:t>twitter.com</a:t>
-            </a:r>
-            <a:r>
-              <a:rPr lang="en-US" dirty="0"/>
-              <a:t>/@jkwuc89</a:t>
-            </a:r>
-          </a:p>
-          <a:p>
-            <a:pPr marL="457200" lvl="1" indent="0">
-              <a:buNone/>
-            </a:pPr>
-            <a:endParaRPr lang="en-US" dirty="0"/>
+              <a:rPr lang="en-US" sz="2000" dirty="0" smtClean="0"/>
+              <a:t>Firefox and IE will not work</a:t>
+            </a:r>
+          </a:p>
+          <a:p>
+            <a:r>
+              <a:rPr lang="en-US" sz="2400" dirty="0" smtClean="0"/>
+              <a:t>Use </a:t>
+            </a:r>
+            <a:r>
+              <a:rPr lang="en-US" sz="2400" dirty="0" err="1" smtClean="0"/>
+              <a:t>console.log</a:t>
+            </a:r>
+            <a:r>
+              <a:rPr lang="en-US" sz="2400" dirty="0" smtClean="0"/>
+              <a:t> liberally</a:t>
+            </a:r>
+          </a:p>
+          <a:p>
+            <a:pPr lvl="1"/>
+            <a:r>
+              <a:rPr lang="en-US" sz="2000" dirty="0" smtClean="0"/>
+              <a:t>No impact on JavaScript performance on device</a:t>
+            </a:r>
+          </a:p>
+          <a:p>
+            <a:pPr lvl="1"/>
+            <a:r>
+              <a:rPr lang="en-US" sz="2000" dirty="0" smtClean="0"/>
+              <a:t>Only way to trace execution on device</a:t>
+            </a:r>
+            <a:endParaRPr lang="en-US" sz="2000" dirty="0"/>
           </a:p>
         </p:txBody>
       </p:sp>
     </p:spTree>
     <p:extLst>
       <p:ext uri="{BB962C8B-B14F-4D97-AF65-F5344CB8AC3E}">
-        <p14:creationId xmlns:p14="http://schemas.microsoft.com/office/powerpoint/2010/main" val="1051326069"/>
+        <p14:creationId xmlns:p14="http://schemas.microsoft.com/office/powerpoint/2010/main" val="153075666"/>
+      </p:ext>
+    </p:extLst>
+  </p:cSld>
+  <p:clrMapOvr>
+    <a:masterClrMapping/>
+  </p:clrMapOvr>
+</p:sld>
+</file>
+
+<file path=ppt/slides/slide18.xml><?xml version="1.0" encoding="utf-8"?>
+<p:sld xmlns:a="http://schemas.openxmlformats.org/drawingml/2006/main" xmlns:r="http://schemas.openxmlformats.org/officeDocument/2006/relationships" xmlns:p="http://schemas.openxmlformats.org/presentationml/2006/main">
+  <p:cSld>
+    <p:spTree>
+      <p:nvGrpSpPr>
+        <p:cNvPr id="1" name=""/>
+        <p:cNvGrpSpPr/>
+        <p:nvPr/>
+      </p:nvGrpSpPr>
+      <p:grpSpPr>
+        <a:xfrm>
+          <a:off x="0" y="0"/>
+          <a:ext cx="0" cy="0"/>
+          <a:chOff x="0" y="0"/>
+          <a:chExt cx="0" cy="0"/>
+        </a:xfrm>
+      </p:grpSpPr>
+      <p:sp>
+        <p:nvSpPr>
+          <p:cNvPr id="2" name="Title 1"/>
+          <p:cNvSpPr>
+            <a:spLocks noGrp="1"/>
+          </p:cNvSpPr>
+          <p:nvPr>
+            <p:ph type="title"/>
+          </p:nvPr>
+        </p:nvSpPr>
+        <p:spPr/>
+        <p:txBody>
+          <a:bodyPr/>
+          <a:lstStyle/>
+          <a:p>
+            <a:r>
+              <a:rPr lang="en-US" dirty="0" smtClean="0"/>
+              <a:t>Useful Add-ons</a:t>
+            </a:r>
+            <a:endParaRPr lang="en-US" dirty="0"/>
+          </a:p>
+        </p:txBody>
+      </p:sp>
+      <p:sp>
+        <p:nvSpPr>
+          <p:cNvPr id="3" name="Content Placeholder 2"/>
+          <p:cNvSpPr>
+            <a:spLocks noGrp="1"/>
+          </p:cNvSpPr>
+          <p:nvPr>
+            <p:ph idx="1"/>
+          </p:nvPr>
+        </p:nvSpPr>
+        <p:spPr/>
+        <p:txBody>
+          <a:bodyPr/>
+          <a:lstStyle/>
+          <a:p>
+            <a:r>
+              <a:rPr lang="en-US" dirty="0" smtClean="0"/>
+              <a:t>SimpleDialog2</a:t>
+            </a:r>
+          </a:p>
+          <a:p>
+            <a:pPr lvl="1"/>
+            <a:r>
+              <a:rPr lang="en-US" sz="2000" dirty="0"/>
+              <a:t>http://</a:t>
+            </a:r>
+            <a:r>
+              <a:rPr lang="en-US" sz="2000" dirty="0" err="1"/>
+              <a:t>dev.jtsage.com</a:t>
+            </a:r>
+            <a:r>
+              <a:rPr lang="en-US" sz="2000" dirty="0"/>
+              <a:t>/</a:t>
+            </a:r>
+            <a:r>
+              <a:rPr lang="en-US" sz="2000" dirty="0" err="1"/>
+              <a:t>jQM-SimpleDialog</a:t>
+            </a:r>
+            <a:r>
+              <a:rPr lang="en-US" sz="2000" dirty="0"/>
+              <a:t>/demos2</a:t>
+            </a:r>
+            <a:r>
+              <a:rPr lang="en-US" sz="2000" dirty="0" smtClean="0"/>
+              <a:t>/</a:t>
+            </a:r>
+          </a:p>
+          <a:p>
+            <a:r>
+              <a:rPr lang="en-US" dirty="0" err="1" smtClean="0"/>
+              <a:t>Mobiscroll</a:t>
+            </a:r>
+            <a:r>
+              <a:rPr lang="en-US" dirty="0" smtClean="0"/>
+              <a:t> – Date &amp; Time </a:t>
+            </a:r>
+            <a:r>
+              <a:rPr lang="en-US" dirty="0" err="1" smtClean="0"/>
+              <a:t>Scroller</a:t>
+            </a:r>
+            <a:endParaRPr lang="en-US" dirty="0" smtClean="0"/>
+          </a:p>
+          <a:p>
+            <a:pPr lvl="1"/>
+            <a:r>
+              <a:rPr lang="en-US" sz="2000" dirty="0"/>
+              <a:t>http://</a:t>
+            </a:r>
+            <a:r>
+              <a:rPr lang="en-US" sz="2000" dirty="0" err="1"/>
+              <a:t>dev.jtsage.com</a:t>
+            </a:r>
+            <a:r>
+              <a:rPr lang="en-US" sz="2000" dirty="0"/>
+              <a:t>/</a:t>
+            </a:r>
+            <a:r>
+              <a:rPr lang="en-US" sz="2000" dirty="0" err="1"/>
+              <a:t>jQM-DateBox</a:t>
+            </a:r>
+            <a:r>
+              <a:rPr lang="en-US" sz="2000" dirty="0" smtClean="0"/>
+              <a:t>/</a:t>
+            </a:r>
+          </a:p>
+          <a:p>
+            <a:r>
+              <a:rPr lang="en-US" dirty="0" smtClean="0"/>
+              <a:t>Signature </a:t>
+            </a:r>
+            <a:r>
+              <a:rPr lang="en-US" dirty="0" smtClean="0"/>
+              <a:t>Pad</a:t>
+            </a:r>
+          </a:p>
+          <a:p>
+            <a:pPr lvl="1"/>
+            <a:r>
+              <a:rPr lang="en-US" sz="2000" dirty="0"/>
+              <a:t>http://</a:t>
+            </a:r>
+            <a:r>
+              <a:rPr lang="en-US" sz="2000" dirty="0" err="1"/>
+              <a:t>thomasjbradley.ca</a:t>
+            </a:r>
+            <a:r>
+              <a:rPr lang="en-US" sz="2000" dirty="0"/>
+              <a:t>/lab/signature-pad</a:t>
+            </a:r>
+            <a:r>
+              <a:rPr lang="en-US" sz="2000" dirty="0" smtClean="0"/>
+              <a:t>/</a:t>
+            </a:r>
+          </a:p>
+        </p:txBody>
+      </p:sp>
+    </p:spTree>
+    <p:extLst>
+      <p:ext uri="{BB962C8B-B14F-4D97-AF65-F5344CB8AC3E}">
+        <p14:creationId xmlns:p14="http://schemas.microsoft.com/office/powerpoint/2010/main" val="2911465124"/>
+      </p:ext>
+    </p:extLst>
+  </p:cSld>
+  <p:clrMapOvr>
+    <a:masterClrMapping/>
+  </p:clrMapOvr>
+</p:sld>
+</file>
+
+<file path=ppt/slides/slide19.xml><?xml version="1.0" encoding="utf-8"?>
+<p:sld xmlns:a="http://schemas.openxmlformats.org/drawingml/2006/main" xmlns:r="http://schemas.openxmlformats.org/officeDocument/2006/relationships" xmlns:p="http://schemas.openxmlformats.org/presentationml/2006/main">
+  <p:cSld>
+    <p:spTree>
+      <p:nvGrpSpPr>
+        <p:cNvPr id="1" name=""/>
+        <p:cNvGrpSpPr/>
+        <p:nvPr/>
+      </p:nvGrpSpPr>
+      <p:grpSpPr>
+        <a:xfrm>
+          <a:off x="0" y="0"/>
+          <a:ext cx="0" cy="0"/>
+          <a:chOff x="0" y="0"/>
+          <a:chExt cx="0" cy="0"/>
+        </a:xfrm>
+      </p:grpSpPr>
+      <p:sp>
+        <p:nvSpPr>
+          <p:cNvPr id="4" name="Title 3"/>
+          <p:cNvSpPr>
+            <a:spLocks noGrp="1"/>
+          </p:cNvSpPr>
+          <p:nvPr>
+            <p:ph type="title"/>
+          </p:nvPr>
+        </p:nvSpPr>
+        <p:spPr/>
+        <p:txBody>
+          <a:bodyPr/>
+          <a:lstStyle/>
+          <a:p>
+            <a:r>
+              <a:rPr lang="en-US" dirty="0" smtClean="0"/>
+              <a:t>Links</a:t>
+            </a:r>
+            <a:endParaRPr lang="en-US" dirty="0"/>
+          </a:p>
+        </p:txBody>
+      </p:sp>
+      <p:sp>
+        <p:nvSpPr>
+          <p:cNvPr id="5" name="Content Placeholder 4"/>
+          <p:cNvSpPr>
+            <a:spLocks noGrp="1"/>
+          </p:cNvSpPr>
+          <p:nvPr>
+            <p:ph sz="half" idx="1"/>
+          </p:nvPr>
+        </p:nvSpPr>
+        <p:spPr>
+          <a:xfrm>
+            <a:off x="838200" y="2362200"/>
+            <a:ext cx="7848600" cy="3724275"/>
+          </a:xfrm>
+        </p:spPr>
+        <p:txBody>
+          <a:bodyPr/>
+          <a:lstStyle/>
+          <a:p>
+            <a:r>
+              <a:rPr lang="en-US" sz="1800" dirty="0" smtClean="0"/>
+              <a:t>JavaScript: The Good Parts</a:t>
+            </a:r>
+          </a:p>
+          <a:p>
+            <a:pPr lvl="1"/>
+            <a:r>
+              <a:rPr lang="en-US" sz="1400" dirty="0"/>
+              <a:t>http://</a:t>
+            </a:r>
+            <a:r>
+              <a:rPr lang="en-US" sz="1400" dirty="0" err="1"/>
+              <a:t>www.amazon.com</a:t>
+            </a:r>
+            <a:r>
+              <a:rPr lang="en-US" sz="1400" dirty="0"/>
+              <a:t>/JavaScript-Good-Parts-Douglas-</a:t>
+            </a:r>
+            <a:r>
+              <a:rPr lang="en-US" sz="1400" dirty="0" err="1"/>
+              <a:t>Crockford</a:t>
+            </a:r>
+            <a:r>
+              <a:rPr lang="en-US" sz="1400" dirty="0"/>
+              <a:t>/</a:t>
+            </a:r>
+            <a:r>
+              <a:rPr lang="en-US" sz="1400" dirty="0" err="1"/>
+              <a:t>dp</a:t>
+            </a:r>
+            <a:r>
+              <a:rPr lang="en-US" sz="1400" dirty="0"/>
+              <a:t>/0596517742</a:t>
+            </a:r>
+          </a:p>
+          <a:p>
+            <a:r>
+              <a:rPr lang="en-US" sz="1800" dirty="0" smtClean="0"/>
+              <a:t>Phonegap</a:t>
+            </a:r>
+            <a:r>
+              <a:rPr lang="en-US" sz="1800" dirty="0"/>
+              <a:t>:</a:t>
+            </a:r>
+          </a:p>
+          <a:p>
+            <a:pPr lvl="1"/>
+            <a:r>
+              <a:rPr lang="en-US" sz="1600" dirty="0"/>
+              <a:t>http://</a:t>
+            </a:r>
+            <a:r>
+              <a:rPr lang="en-US" sz="1600" dirty="0" err="1"/>
+              <a:t>docs.phonegap.com</a:t>
+            </a:r>
+            <a:r>
+              <a:rPr lang="en-US" sz="1600" dirty="0"/>
+              <a:t>/en/2.6.0/</a:t>
+            </a:r>
+            <a:r>
+              <a:rPr lang="en-US" sz="1600" dirty="0" err="1"/>
+              <a:t>index.html</a:t>
+            </a:r>
+            <a:endParaRPr lang="en-US" sz="1600" dirty="0" smtClean="0"/>
+          </a:p>
+          <a:p>
+            <a:r>
+              <a:rPr lang="en-US" sz="1800" dirty="0" smtClean="0"/>
+              <a:t>jQuery Mobile:</a:t>
+            </a:r>
+          </a:p>
+          <a:p>
+            <a:pPr lvl="1"/>
+            <a:r>
+              <a:rPr lang="en-US" sz="1600" dirty="0"/>
+              <a:t>http://</a:t>
+            </a:r>
+            <a:r>
+              <a:rPr lang="en-US" sz="1600" dirty="0" err="1"/>
+              <a:t>jquerymobile.com</a:t>
+            </a:r>
+            <a:r>
+              <a:rPr lang="en-US" sz="1600" dirty="0"/>
+              <a:t>/demos/1.3.0/</a:t>
+            </a:r>
+            <a:endParaRPr lang="en-US" sz="1600" dirty="0"/>
+          </a:p>
+          <a:p>
+            <a:r>
+              <a:rPr lang="en-US" sz="1800" dirty="0" smtClean="0"/>
+              <a:t>W3C</a:t>
+            </a:r>
+            <a:endParaRPr lang="en-US" sz="1800" dirty="0"/>
+          </a:p>
+          <a:p>
+            <a:pPr lvl="1"/>
+            <a:r>
+              <a:rPr lang="en-US" sz="1600" dirty="0"/>
+              <a:t>Web Storage: http://www.w3.org/TR/</a:t>
+            </a:r>
+            <a:r>
+              <a:rPr lang="en-US" sz="1600" dirty="0" err="1"/>
+              <a:t>webstorage</a:t>
+            </a:r>
+            <a:r>
+              <a:rPr lang="en-US" sz="1600" dirty="0"/>
+              <a:t>/</a:t>
+            </a:r>
+          </a:p>
+          <a:p>
+            <a:pPr lvl="1"/>
+            <a:r>
+              <a:rPr lang="en-US" sz="1600" dirty="0" smtClean="0"/>
+              <a:t>Web </a:t>
+            </a:r>
+            <a:r>
+              <a:rPr lang="en-US" sz="1600" dirty="0"/>
+              <a:t>SQL Database: http://www.w3.org/TR/</a:t>
+            </a:r>
+            <a:r>
+              <a:rPr lang="en-US" sz="1600" dirty="0" err="1"/>
+              <a:t>webdatabase</a:t>
+            </a:r>
+            <a:r>
+              <a:rPr lang="en-US" sz="1600" dirty="0"/>
+              <a:t>/</a:t>
+            </a:r>
+          </a:p>
+          <a:p>
+            <a:r>
+              <a:rPr lang="en-US" sz="1800" dirty="0" smtClean="0"/>
+              <a:t>Knockout</a:t>
+            </a:r>
+            <a:endParaRPr lang="en-US" sz="1800" dirty="0"/>
+          </a:p>
+          <a:p>
+            <a:pPr lvl="1"/>
+            <a:r>
+              <a:rPr lang="en-US" sz="1600" dirty="0"/>
+              <a:t>http://</a:t>
+            </a:r>
+            <a:r>
+              <a:rPr lang="en-US" sz="1600" dirty="0" err="1"/>
+              <a:t>knockoutjs.com</a:t>
+            </a:r>
+            <a:r>
+              <a:rPr lang="en-US" sz="1600" dirty="0"/>
+              <a:t>/documentation/</a:t>
+            </a:r>
+            <a:r>
+              <a:rPr lang="en-US" sz="1600" dirty="0" err="1"/>
+              <a:t>introduction.html</a:t>
+            </a:r>
+            <a:endParaRPr lang="en-US" sz="1600" dirty="0"/>
+          </a:p>
+          <a:p>
+            <a:pPr lvl="1"/>
+            <a:r>
+              <a:rPr lang="en-US" sz="1600" dirty="0"/>
+              <a:t>http://</a:t>
+            </a:r>
+            <a:r>
+              <a:rPr lang="en-US" sz="1600" dirty="0" err="1"/>
+              <a:t>knockoutjs.com</a:t>
+            </a:r>
+            <a:r>
+              <a:rPr lang="en-US" sz="1600" dirty="0"/>
+              <a:t>/documentation/plugins-</a:t>
+            </a:r>
+            <a:r>
+              <a:rPr lang="en-US" sz="1600" dirty="0" err="1"/>
+              <a:t>mapping.html</a:t>
+            </a:r>
+            <a:endParaRPr lang="en-US" sz="1600" dirty="0"/>
+          </a:p>
+          <a:p>
+            <a:pPr marL="0" indent="0">
+              <a:buNone/>
+            </a:pPr>
+            <a:endParaRPr lang="en-US" sz="4000" dirty="0"/>
+          </a:p>
+        </p:txBody>
+      </p:sp>
+    </p:spTree>
+    <p:extLst>
+      <p:ext uri="{BB962C8B-B14F-4D97-AF65-F5344CB8AC3E}">
+        <p14:creationId xmlns:p14="http://schemas.microsoft.com/office/powerpoint/2010/main" val="2432929412"/>
       </p:ext>
     </p:extLst>
   </p:cSld>
@@ -9725,92 +10069,110 @@
           <a:lstStyle/>
           <a:p>
             <a:r>
-              <a:rPr lang="en-US" sz="2000" dirty="0" smtClean="0"/>
-              <a:t>Introduction</a:t>
-            </a:r>
-          </a:p>
-          <a:p>
-            <a:r>
-              <a:rPr lang="en-US" sz="2000" dirty="0" smtClean="0"/>
+              <a:rPr lang="en-US" sz="1800" dirty="0" smtClean="0"/>
+              <a:t>Introduction / Getting Started</a:t>
+            </a:r>
+            <a:endParaRPr lang="en-US" sz="1800" dirty="0" smtClean="0"/>
+          </a:p>
+          <a:p>
+            <a:r>
+              <a:rPr lang="en-US" sz="1800" dirty="0" smtClean="0"/>
               <a:t>Project Structure</a:t>
             </a:r>
-            <a:endParaRPr lang="en-US" sz="2000" dirty="0"/>
-          </a:p>
-          <a:p>
-            <a:r>
-              <a:rPr lang="en-US" sz="2000" dirty="0"/>
+            <a:endParaRPr lang="en-US" sz="1800" dirty="0"/>
+          </a:p>
+          <a:p>
+            <a:r>
+              <a:rPr lang="en-US" sz="1800" dirty="0"/>
               <a:t>Data </a:t>
             </a:r>
             <a:r>
-              <a:rPr lang="en-US" sz="2000" dirty="0" smtClean="0"/>
+              <a:rPr lang="en-US" sz="1800" dirty="0" smtClean="0"/>
               <a:t>Management </a:t>
             </a:r>
             <a:r>
-              <a:rPr lang="en-US" sz="2000" dirty="0"/>
+              <a:rPr lang="en-US" sz="1800" dirty="0"/>
               <a:t>with JSON, HTML5 local storage and </a:t>
             </a:r>
             <a:r>
-              <a:rPr lang="en-US" sz="2000" dirty="0" smtClean="0"/>
+              <a:rPr lang="en-US" sz="1800" dirty="0" smtClean="0"/>
               <a:t>Web SQL DB</a:t>
             </a:r>
-            <a:endParaRPr lang="en-US" sz="2000" dirty="0"/>
-          </a:p>
-          <a:p>
-            <a:r>
-              <a:rPr lang="en-US" sz="2000" dirty="0" smtClean="0"/>
+            <a:endParaRPr lang="en-US" sz="1800" dirty="0"/>
+          </a:p>
+          <a:p>
+            <a:r>
+              <a:rPr lang="en-US" sz="1800" dirty="0" smtClean="0"/>
               <a:t>Data </a:t>
             </a:r>
             <a:r>
-              <a:rPr lang="en-US" sz="2000" dirty="0"/>
+              <a:rPr lang="en-US" sz="1800" dirty="0"/>
               <a:t>B</a:t>
             </a:r>
             <a:r>
-              <a:rPr lang="en-US" sz="2000" dirty="0" smtClean="0"/>
+              <a:rPr lang="en-US" sz="1800" dirty="0" smtClean="0"/>
               <a:t>inding via Knockout</a:t>
             </a:r>
-            <a:endParaRPr lang="en-US" sz="2000" dirty="0"/>
-          </a:p>
-          <a:p>
-            <a:r>
-              <a:rPr lang="en-US" sz="2000" dirty="0" err="1" smtClean="0"/>
+            <a:endParaRPr lang="en-US" sz="1800" dirty="0"/>
+          </a:p>
+          <a:p>
+            <a:r>
+              <a:rPr lang="en-US" sz="1800" dirty="0" err="1" smtClean="0"/>
               <a:t>Underscore.js</a:t>
             </a:r>
-            <a:endParaRPr lang="en-US" sz="2000" dirty="0" smtClean="0"/>
-          </a:p>
-          <a:p>
-            <a:r>
-              <a:rPr lang="en-US" sz="2000" dirty="0" smtClean="0"/>
+            <a:endParaRPr lang="en-US" sz="1800" dirty="0" smtClean="0"/>
+          </a:p>
+          <a:p>
+            <a:r>
+              <a:rPr lang="en-US" sz="1800" dirty="0" smtClean="0"/>
               <a:t>HTML Templates via EJS</a:t>
             </a:r>
-            <a:endParaRPr lang="en-US" sz="2000" dirty="0"/>
-          </a:p>
-          <a:p>
-            <a:r>
-              <a:rPr lang="en-US" sz="2000" dirty="0"/>
+            <a:endParaRPr lang="en-US" sz="1800" dirty="0"/>
+          </a:p>
+          <a:p>
+            <a:r>
+              <a:rPr lang="en-US" sz="1800" dirty="0"/>
               <a:t>Globalization using </a:t>
             </a:r>
             <a:r>
-              <a:rPr lang="en-US" sz="2000" dirty="0" err="1"/>
+              <a:rPr lang="en-US" sz="1800" dirty="0" err="1"/>
               <a:t>jquery</a:t>
             </a:r>
             <a:r>
-              <a:rPr lang="en-US" sz="2000" dirty="0"/>
-              <a:t> / globalize</a:t>
-            </a:r>
-          </a:p>
-          <a:p>
-            <a:r>
-              <a:rPr lang="en-US" sz="2000" dirty="0" smtClean="0"/>
+              <a:rPr lang="en-US" sz="1800" dirty="0"/>
+              <a:t> / </a:t>
+            </a:r>
+            <a:r>
+              <a:rPr lang="en-US" sz="1800" dirty="0" smtClean="0"/>
+              <a:t>globalize</a:t>
+            </a:r>
+          </a:p>
+          <a:p>
+            <a:r>
+              <a:rPr lang="en-US" sz="1800" dirty="0" smtClean="0"/>
+              <a:t>Lessons Learned and Gotcha’s</a:t>
+            </a:r>
+            <a:endParaRPr lang="en-US" sz="1800" dirty="0"/>
+          </a:p>
+          <a:p>
+            <a:r>
+              <a:rPr lang="en-US" sz="1800" dirty="0" smtClean="0"/>
               <a:t>Useful Add-ons</a:t>
             </a:r>
-            <a:endParaRPr lang="en-US" sz="2000" dirty="0"/>
-          </a:p>
-          <a:p>
-            <a:r>
-              <a:rPr lang="en-US" sz="2000" dirty="0" smtClean="0"/>
+            <a:endParaRPr lang="en-US" sz="1800" dirty="0"/>
+          </a:p>
+          <a:p>
+            <a:r>
+              <a:rPr lang="en-US" sz="1800" dirty="0" smtClean="0"/>
+              <a:t>Links</a:t>
+            </a:r>
+          </a:p>
+          <a:p>
+            <a:r>
+              <a:rPr lang="en-US" sz="1800" dirty="0" smtClean="0"/>
               <a:t>Questions</a:t>
             </a:r>
-            <a:endParaRPr lang="en-US" sz="2000" dirty="0"/>
+            <a:endParaRPr lang="en-US" sz="1800" dirty="0"/>
           </a:p>
         </p:txBody>
       </p:sp>
@@ -9818,6 +10180,357 @@
     <p:extLst>
       <p:ext uri="{BB962C8B-B14F-4D97-AF65-F5344CB8AC3E}">
         <p14:creationId xmlns:p14="http://schemas.microsoft.com/office/powerpoint/2010/main" val="2613194534"/>
+      </p:ext>
+    </p:extLst>
+  </p:cSld>
+  <p:clrMapOvr>
+    <a:masterClrMapping/>
+  </p:clrMapOvr>
+</p:sld>
+</file>
+
+<file path=ppt/slides/slide20.xml><?xml version="1.0" encoding="utf-8"?>
+<p:sld xmlns:a="http://schemas.openxmlformats.org/drawingml/2006/main" xmlns:r="http://schemas.openxmlformats.org/officeDocument/2006/relationships" xmlns:p="http://schemas.openxmlformats.org/presentationml/2006/main">
+  <p:cSld>
+    <p:spTree>
+      <p:nvGrpSpPr>
+        <p:cNvPr id="1" name=""/>
+        <p:cNvGrpSpPr/>
+        <p:nvPr/>
+      </p:nvGrpSpPr>
+      <p:grpSpPr>
+        <a:xfrm>
+          <a:off x="0" y="0"/>
+          <a:ext cx="0" cy="0"/>
+          <a:chOff x="0" y="0"/>
+          <a:chExt cx="0" cy="0"/>
+        </a:xfrm>
+      </p:grpSpPr>
+      <p:sp>
+        <p:nvSpPr>
+          <p:cNvPr id="2" name="Title 1"/>
+          <p:cNvSpPr>
+            <a:spLocks noGrp="1"/>
+          </p:cNvSpPr>
+          <p:nvPr>
+            <p:ph type="title"/>
+          </p:nvPr>
+        </p:nvSpPr>
+        <p:spPr/>
+        <p:txBody>
+          <a:bodyPr/>
+          <a:lstStyle/>
+          <a:p>
+            <a:r>
+              <a:rPr lang="en-US" dirty="0" smtClean="0"/>
+              <a:t>More Links</a:t>
+            </a:r>
+            <a:endParaRPr lang="en-US" dirty="0"/>
+          </a:p>
+        </p:txBody>
+      </p:sp>
+      <p:sp>
+        <p:nvSpPr>
+          <p:cNvPr id="3" name="Content Placeholder 2"/>
+          <p:cNvSpPr>
+            <a:spLocks noGrp="1"/>
+          </p:cNvSpPr>
+          <p:nvPr>
+            <p:ph idx="1"/>
+          </p:nvPr>
+        </p:nvSpPr>
+        <p:spPr/>
+        <p:txBody>
+          <a:bodyPr/>
+          <a:lstStyle/>
+          <a:p>
+            <a:r>
+              <a:rPr lang="en-US" sz="1800" dirty="0" err="1" smtClean="0"/>
+              <a:t>Underscore.js</a:t>
+            </a:r>
+            <a:r>
+              <a:rPr lang="en-US" sz="1800" dirty="0" smtClean="0"/>
+              <a:t>:</a:t>
+            </a:r>
+          </a:p>
+          <a:p>
+            <a:pPr lvl="1"/>
+            <a:r>
+              <a:rPr lang="en-US" sz="1600" dirty="0" smtClean="0"/>
+              <a:t>http</a:t>
+            </a:r>
+            <a:r>
+              <a:rPr lang="en-US" sz="1600" dirty="0"/>
+              <a:t>://</a:t>
+            </a:r>
+            <a:r>
+              <a:rPr lang="en-US" sz="1600" dirty="0" err="1"/>
+              <a:t>documentcloud.github.com</a:t>
+            </a:r>
+            <a:r>
+              <a:rPr lang="en-US" sz="1600" dirty="0"/>
+              <a:t>/underscore/</a:t>
+            </a:r>
+          </a:p>
+          <a:p>
+            <a:r>
+              <a:rPr lang="en-US" sz="1800" dirty="0" smtClean="0"/>
+              <a:t>EJS:</a:t>
+            </a:r>
+          </a:p>
+          <a:p>
+            <a:pPr lvl="1"/>
+            <a:r>
+              <a:rPr lang="en-US" sz="1600" dirty="0" smtClean="0"/>
+              <a:t>http</a:t>
+            </a:r>
+            <a:r>
+              <a:rPr lang="en-US" sz="1600" dirty="0"/>
+              <a:t>://</a:t>
+            </a:r>
+            <a:r>
+              <a:rPr lang="en-US" sz="1600" dirty="0" err="1"/>
+              <a:t>embeddedjs.com</a:t>
+            </a:r>
+            <a:r>
+              <a:rPr lang="en-US" sz="1600" dirty="0"/>
+              <a:t>/</a:t>
+            </a:r>
+          </a:p>
+          <a:p>
+            <a:r>
+              <a:rPr lang="en-US" sz="1800" dirty="0" err="1" smtClean="0"/>
+              <a:t>jquery</a:t>
+            </a:r>
+            <a:r>
+              <a:rPr lang="en-US" sz="1800" dirty="0" smtClean="0"/>
+              <a:t> </a:t>
+            </a:r>
+            <a:r>
+              <a:rPr lang="en-US" sz="1800" dirty="0"/>
+              <a:t>/ </a:t>
+            </a:r>
+            <a:r>
+              <a:rPr lang="en-US" sz="1800" dirty="0" smtClean="0"/>
+              <a:t>globalize:</a:t>
+            </a:r>
+          </a:p>
+          <a:p>
+            <a:pPr lvl="1"/>
+            <a:r>
+              <a:rPr lang="en-US" sz="1600" dirty="0" smtClean="0"/>
+              <a:t>https</a:t>
+            </a:r>
+            <a:r>
+              <a:rPr lang="en-US" sz="1600" dirty="0"/>
+              <a:t>://</a:t>
+            </a:r>
+            <a:r>
+              <a:rPr lang="en-US" sz="1600" dirty="0" err="1"/>
+              <a:t>github.com</a:t>
+            </a:r>
+            <a:r>
+              <a:rPr lang="en-US" sz="1600" dirty="0"/>
+              <a:t>/</a:t>
+            </a:r>
+            <a:r>
+              <a:rPr lang="en-US" sz="1600" dirty="0" err="1"/>
+              <a:t>jquery</a:t>
+            </a:r>
+            <a:r>
+              <a:rPr lang="en-US" sz="1600" dirty="0"/>
+              <a:t>/globalize</a:t>
+            </a:r>
+          </a:p>
+          <a:p>
+            <a:r>
+              <a:rPr lang="en-US" sz="1800" dirty="0" smtClean="0"/>
+              <a:t>jquery-i18n:</a:t>
+            </a:r>
+          </a:p>
+          <a:p>
+            <a:pPr lvl="1"/>
+            <a:r>
+              <a:rPr lang="en-US" sz="1400" dirty="0"/>
+              <a:t>http://</a:t>
+            </a:r>
+            <a:r>
+              <a:rPr lang="en-US" sz="1400" dirty="0" err="1"/>
+              <a:t>code.google.com</a:t>
+            </a:r>
+            <a:r>
+              <a:rPr lang="en-US" sz="1400" dirty="0"/>
+              <a:t>/p/jquery-i18n-properties/</a:t>
+            </a:r>
+            <a:endParaRPr lang="en-US" sz="1400" dirty="0" smtClean="0"/>
+          </a:p>
+          <a:p>
+            <a:r>
+              <a:rPr lang="en-US" sz="1800" dirty="0" smtClean="0"/>
+              <a:t>JSON </a:t>
+            </a:r>
+            <a:r>
+              <a:rPr lang="en-US" sz="1800" dirty="0" smtClean="0"/>
+              <a:t>Validator:</a:t>
+            </a:r>
+          </a:p>
+          <a:p>
+            <a:pPr lvl="1"/>
+            <a:r>
+              <a:rPr lang="en-US" sz="1600" dirty="0" smtClean="0"/>
+              <a:t>http</a:t>
+            </a:r>
+            <a:r>
+              <a:rPr lang="en-US" sz="1600" dirty="0"/>
+              <a:t>://</a:t>
+            </a:r>
+            <a:r>
+              <a:rPr lang="en-US" sz="1600" dirty="0" err="1"/>
+              <a:t>jsonlint.com</a:t>
+            </a:r>
+            <a:r>
+              <a:rPr lang="en-US" sz="1600" dirty="0" smtClean="0"/>
+              <a:t>/</a:t>
+            </a:r>
+          </a:p>
+          <a:p>
+            <a:r>
+              <a:rPr lang="en-US" sz="2000" dirty="0" err="1" smtClean="0"/>
+              <a:t>jsFiddle</a:t>
+            </a:r>
+            <a:endParaRPr lang="en-US" sz="2000" dirty="0" smtClean="0"/>
+          </a:p>
+          <a:p>
+            <a:pPr lvl="1"/>
+            <a:r>
+              <a:rPr lang="en-US" sz="1600" dirty="0"/>
+              <a:t>http://</a:t>
+            </a:r>
+            <a:r>
+              <a:rPr lang="en-US" sz="1600" dirty="0" err="1"/>
+              <a:t>jsfiddle.net</a:t>
+            </a:r>
+            <a:r>
+              <a:rPr lang="en-US" sz="1600" dirty="0"/>
+              <a:t>/</a:t>
+            </a:r>
+          </a:p>
+          <a:p>
+            <a:endParaRPr lang="en-US" sz="2000" dirty="0"/>
+          </a:p>
+          <a:p>
+            <a:endParaRPr lang="en-US" sz="2000" dirty="0"/>
+          </a:p>
+        </p:txBody>
+      </p:sp>
+    </p:spTree>
+    <p:extLst>
+      <p:ext uri="{BB962C8B-B14F-4D97-AF65-F5344CB8AC3E}">
+        <p14:creationId xmlns:p14="http://schemas.microsoft.com/office/powerpoint/2010/main" val="3712984815"/>
+      </p:ext>
+    </p:extLst>
+  </p:cSld>
+  <p:clrMapOvr>
+    <a:masterClrMapping/>
+  </p:clrMapOvr>
+</p:sld>
+</file>
+
+<file path=ppt/slides/slide21.xml><?xml version="1.0" encoding="utf-8"?>
+<p:sld xmlns:a="http://schemas.openxmlformats.org/drawingml/2006/main" xmlns:r="http://schemas.openxmlformats.org/officeDocument/2006/relationships" xmlns:p="http://schemas.openxmlformats.org/presentationml/2006/main">
+  <p:cSld>
+    <p:spTree>
+      <p:nvGrpSpPr>
+        <p:cNvPr id="1" name=""/>
+        <p:cNvGrpSpPr/>
+        <p:nvPr/>
+      </p:nvGrpSpPr>
+      <p:grpSpPr>
+        <a:xfrm>
+          <a:off x="0" y="0"/>
+          <a:ext cx="0" cy="0"/>
+          <a:chOff x="0" y="0"/>
+          <a:chExt cx="0" cy="0"/>
+        </a:xfrm>
+      </p:grpSpPr>
+      <p:sp>
+        <p:nvSpPr>
+          <p:cNvPr id="2" name="Title 1"/>
+          <p:cNvSpPr>
+            <a:spLocks noGrp="1"/>
+          </p:cNvSpPr>
+          <p:nvPr>
+            <p:ph type="title"/>
+          </p:nvPr>
+        </p:nvSpPr>
+        <p:spPr/>
+        <p:txBody>
+          <a:bodyPr/>
+          <a:lstStyle/>
+          <a:p>
+            <a:r>
+              <a:rPr lang="en-US" dirty="0" smtClean="0"/>
+              <a:t>Questions</a:t>
+            </a:r>
+            <a:endParaRPr lang="en-US" dirty="0"/>
+          </a:p>
+        </p:txBody>
+      </p:sp>
+      <p:sp>
+        <p:nvSpPr>
+          <p:cNvPr id="3" name="Content Placeholder 2"/>
+          <p:cNvSpPr>
+            <a:spLocks noGrp="1"/>
+          </p:cNvSpPr>
+          <p:nvPr>
+            <p:ph idx="1"/>
+          </p:nvPr>
+        </p:nvSpPr>
+        <p:spPr/>
+        <p:txBody>
+          <a:bodyPr/>
+          <a:lstStyle/>
+          <a:p>
+            <a:r>
+              <a:rPr lang="en-US" dirty="0"/>
+              <a:t>My contact info:</a:t>
+            </a:r>
+          </a:p>
+          <a:p>
+            <a:pPr lvl="1"/>
+            <a:r>
+              <a:rPr lang="en-US" dirty="0" err="1"/>
+              <a:t>keith.wedinger@</a:t>
+            </a:r>
+            <a:r>
+              <a:rPr lang="en-US" dirty="0" err="1" smtClean="0"/>
+              <a:t>leadingedje.com</a:t>
+            </a:r>
+            <a:endParaRPr lang="en-US" dirty="0" smtClean="0"/>
+          </a:p>
+          <a:p>
+            <a:pPr lvl="1"/>
+            <a:r>
+              <a:rPr lang="en-US" dirty="0" smtClean="0"/>
+              <a:t>Twitter: @</a:t>
+            </a:r>
+            <a:r>
+              <a:rPr lang="en-US" dirty="0"/>
+              <a:t>jkwuc89</a:t>
+            </a:r>
+          </a:p>
+          <a:p>
+            <a:pPr marL="457200" lvl="1" indent="0">
+              <a:buNone/>
+            </a:pPr>
+            <a:endParaRPr lang="en-US" dirty="0"/>
+          </a:p>
+        </p:txBody>
+      </p:sp>
+    </p:spTree>
+    <p:extLst>
+      <p:ext uri="{BB962C8B-B14F-4D97-AF65-F5344CB8AC3E}">
+        <p14:creationId xmlns:p14="http://schemas.microsoft.com/office/powerpoint/2010/main" val="1051326069"/>
       </p:ext>
     </p:extLst>
   </p:cSld>
@@ -9891,7 +10604,15 @@
             <a:pPr lvl="1"/>
             <a:r>
               <a:rPr lang="en-US" sz="2000" dirty="0"/>
-              <a:t>Over 22 years experience designing, developing and delivering high quality software solutions for several companies including Lexmark, Diebold, Limited Brands, Sterling Commerce and IBM.</a:t>
+              <a:t>Over </a:t>
+            </a:r>
+            <a:r>
+              <a:rPr lang="en-US" sz="2000" dirty="0" smtClean="0"/>
+              <a:t>23 </a:t>
+            </a:r>
+            <a:r>
+              <a:rPr lang="en-US" sz="2000" dirty="0"/>
+              <a:t>years experience designing, developing and delivering high quality software solutions for several companies including Lexmark, Diebold, Limited Brands, Sterling Commerce and IBM.</a:t>
             </a:r>
           </a:p>
           <a:p>
@@ -9914,12 +10635,20 @@
               <a:t>“Creating custom technology solutions while making the business world a </a:t>
             </a:r>
             <a:r>
-              <a:rPr lang="en-US" sz="2000" dirty="0" err="1"/>
+              <a:rPr lang="en-US" sz="2000" dirty="0" smtClean="0"/>
+              <a:t>“</a:t>
+            </a:r>
+            <a:r>
+              <a:rPr lang="en-US" sz="2000" dirty="0" err="1" smtClean="0"/>
               <a:t>funner</a:t>
             </a:r>
             <a:r>
+              <a:rPr lang="en-US" sz="2000" dirty="0" smtClean="0"/>
+              <a:t> </a:t>
+            </a:r>
+            <a:r>
               <a:rPr lang="en-US" sz="2000" dirty="0"/>
-              <a:t> place to work</a:t>
+              <a:t>place to work</a:t>
             </a:r>
             <a:r>
               <a:rPr lang="en-US" sz="2000" dirty="0" smtClean="0"/>
@@ -10005,22 +10734,14 @@
             <a:pPr lvl="1"/>
             <a:r>
               <a:rPr lang="en-US" sz="1800" dirty="0" smtClean="0"/>
-              <a:t>Package and distribute a web app as a native </a:t>
-            </a:r>
-            <a:r>
-              <a:rPr lang="en-US" sz="1800" dirty="0" smtClean="0"/>
-              <a:t>app</a:t>
+              <a:t>Package and distribute a web app as a native app</a:t>
             </a:r>
           </a:p>
           <a:p>
             <a:pPr lvl="2"/>
             <a:r>
               <a:rPr lang="en-US" sz="1600" dirty="0" smtClean="0"/>
-              <a:t>Supported platforms: </a:t>
-            </a:r>
-            <a:r>
-              <a:rPr lang="en-US" sz="1600" dirty="0" smtClean="0"/>
-              <a:t> Android, Blackberry, </a:t>
+              <a:t>Supported platforms:  Android, Blackberry, </a:t>
             </a:r>
             <a:r>
               <a:rPr lang="en-US" sz="1600" dirty="0" err="1" smtClean="0"/>
@@ -10045,17 +10766,12 @@
               <a:rPr lang="en-US" sz="1600" dirty="0" smtClean="0"/>
               <a:t>App runs inside device’s internal browser via web view started by Phonegap provided native code for each platform</a:t>
             </a:r>
-            <a:endParaRPr lang="en-US" sz="1600" dirty="0" smtClean="0"/>
           </a:p>
           <a:p>
             <a:pPr lvl="1"/>
             <a:r>
               <a:rPr lang="en-US" sz="1800" dirty="0" smtClean="0"/>
-              <a:t>Expose device functionality via JavaScript </a:t>
-            </a:r>
-            <a:r>
-              <a:rPr lang="en-US" sz="1800" dirty="0" smtClean="0"/>
-              <a:t>APIs</a:t>
+              <a:t>Expose device functionality via JavaScript APIs</a:t>
             </a:r>
           </a:p>
           <a:p>
@@ -10064,7 +10780,6 @@
               <a:rPr lang="en-US" sz="1400" dirty="0" smtClean="0"/>
               <a:t>Examples: Camera, Compass, Contacts, GPS, Device Events, </a:t>
             </a:r>
-            <a:endParaRPr lang="en-US" sz="1400" dirty="0" smtClean="0"/>
           </a:p>
           <a:p>
             <a:pPr lvl="1"/>
@@ -10077,48 +10792,26 @@
             <a:pPr lvl="2"/>
             <a:r>
               <a:rPr lang="en-US" sz="1600" dirty="0" smtClean="0"/>
-              <a:t>Android: Eclipse, Android SDK, JDK</a:t>
+              <a:t>Android: </a:t>
+            </a:r>
+            <a:r>
+              <a:rPr lang="en-US" sz="1600" dirty="0" smtClean="0"/>
+              <a:t>Eclipse / IntelliJ IDEA, </a:t>
+            </a:r>
+            <a:r>
+              <a:rPr lang="en-US" sz="1600" dirty="0" smtClean="0"/>
+              <a:t>Android SDK, JDK</a:t>
             </a:r>
           </a:p>
           <a:p>
             <a:pPr lvl="2"/>
             <a:r>
-              <a:rPr lang="en-US" sz="1600" dirty="0" err="1" smtClean="0"/>
-              <a:t>iOS</a:t>
-            </a:r>
-            <a:r>
               <a:rPr lang="en-US" sz="1600" dirty="0" smtClean="0"/>
-              <a:t>: </a:t>
-            </a:r>
-            <a:r>
-              <a:rPr lang="en-US" sz="1600" dirty="0" err="1" smtClean="0"/>
-              <a:t>Xcode</a:t>
+              <a:t>iOS: Xcode with iOS </a:t>
             </a:r>
             <a:r>
               <a:rPr lang="en-US" sz="1600" dirty="0" smtClean="0"/>
-              <a:t> with </a:t>
-            </a:r>
-            <a:r>
-              <a:rPr lang="en-US" sz="1600" dirty="0" err="1" smtClean="0"/>
-              <a:t>iOS</a:t>
-            </a:r>
-            <a:r>
-              <a:rPr lang="en-US" sz="1600" dirty="0" smtClean="0"/>
-              <a:t> SDK</a:t>
-            </a:r>
-          </a:p>
-          <a:p>
-            <a:pPr lvl="1"/>
-            <a:r>
-              <a:rPr lang="en-US" sz="1800" dirty="0" smtClean="0"/>
-              <a:t>Assumptions:</a:t>
-            </a:r>
-          </a:p>
-          <a:p>
-            <a:pPr lvl="2"/>
-            <a:r>
-              <a:rPr lang="en-US" sz="1600" dirty="0" smtClean="0"/>
-              <a:t>Familiarity with web development using HTML5, JavaScript</a:t>
+              <a:t>SDK</a:t>
             </a:r>
             <a:endParaRPr lang="en-US" sz="1600" dirty="0" smtClean="0"/>
           </a:p>
@@ -10228,25 +10921,6 @@
           </a:p>
           <a:p>
             <a:pPr lvl="1"/>
-            <a:r>
-              <a:rPr lang="en-US" dirty="0" smtClean="0"/>
-              <a:t>Assumptions:</a:t>
-            </a:r>
-          </a:p>
-          <a:p>
-            <a:pPr lvl="2"/>
-            <a:r>
-              <a:rPr lang="en-US" dirty="0"/>
-              <a:t>Familiarity with HTML5, </a:t>
-            </a:r>
-            <a:r>
-              <a:rPr lang="en-US" dirty="0" smtClean="0"/>
-              <a:t>JavaScript and jQuery</a:t>
-            </a:r>
-            <a:endParaRPr lang="en-US" dirty="0"/>
-          </a:p>
-          <a:p>
-            <a:pPr lvl="1"/>
             <a:endParaRPr lang="en-US" dirty="0" smtClean="0"/>
           </a:p>
           <a:p>
@@ -10308,7 +10982,7 @@
           <a:p>
             <a:r>
               <a:rPr lang="en-US" dirty="0" smtClean="0"/>
-              <a:t>Introduction</a:t>
+              <a:t>Assumptions</a:t>
             </a:r>
             <a:endParaRPr lang="en-US" dirty="0"/>
           </a:p>
@@ -10330,92 +11004,44 @@
           <a:lstStyle/>
           <a:p>
             <a:r>
-              <a:rPr lang="en-US" sz="2000" dirty="0" smtClean="0"/>
-              <a:t>Performance</a:t>
+              <a:rPr lang="en-US" dirty="0" smtClean="0"/>
+              <a:t>Familiarity with:</a:t>
             </a:r>
           </a:p>
           <a:p>
             <a:pPr lvl="1"/>
             <a:r>
-              <a:rPr lang="en-US" sz="1800" dirty="0" smtClean="0"/>
-              <a:t>Depends on device and OS</a:t>
+              <a:rPr lang="en-US" dirty="0" smtClean="0"/>
+              <a:t>HTML5</a:t>
             </a:r>
           </a:p>
           <a:p>
             <a:pPr lvl="1"/>
             <a:r>
-              <a:rPr lang="en-US" sz="1800" dirty="0" err="1" smtClean="0"/>
-              <a:t>iOS</a:t>
-            </a:r>
-            <a:r>
-              <a:rPr lang="en-US" sz="1800" dirty="0" smtClean="0"/>
-              <a:t> generally faster than Android</a:t>
+              <a:rPr lang="en-US" dirty="0" smtClean="0"/>
+              <a:t>CSS</a:t>
             </a:r>
           </a:p>
           <a:p>
             <a:pPr lvl="1"/>
             <a:r>
-              <a:rPr lang="en-US" sz="1800" dirty="0" smtClean="0"/>
-              <a:t>Later Android versions generally faster than earlier versions</a:t>
-            </a:r>
-          </a:p>
-          <a:p>
-            <a:pPr lvl="2"/>
-            <a:r>
-              <a:rPr lang="en-US" sz="1600" dirty="0" smtClean="0"/>
-              <a:t>Recommend Ice Cream Sandwich as minimum</a:t>
-            </a:r>
-          </a:p>
-          <a:p>
-            <a:r>
-              <a:rPr lang="en-US" sz="2000" dirty="0" smtClean="0"/>
-              <a:t>Device differences</a:t>
-            </a:r>
-          </a:p>
-          <a:p>
-            <a:pPr lvl="1"/>
-            <a:r>
-              <a:rPr lang="en-US" sz="1600" dirty="0" smtClean="0"/>
-              <a:t>Screen resolutions and screen rotation</a:t>
-            </a:r>
-          </a:p>
-          <a:p>
-            <a:pPr lvl="1"/>
-            <a:r>
-              <a:rPr lang="en-US" sz="1600" dirty="0" smtClean="0"/>
-              <a:t>Device independence != screen resolution independence</a:t>
-            </a:r>
-          </a:p>
-          <a:p>
-            <a:r>
-              <a:rPr lang="en-US" sz="2000" dirty="0" smtClean="0"/>
-              <a:t>Browser Anomalies</a:t>
-            </a:r>
-          </a:p>
-          <a:p>
-            <a:pPr lvl="1"/>
-            <a:r>
-              <a:rPr lang="en-US" sz="1800" dirty="0" smtClean="0"/>
-              <a:t>Don’t assume that what works on desktop browser will just work on device.</a:t>
-            </a:r>
-          </a:p>
-          <a:p>
-            <a:pPr lvl="1"/>
-            <a:r>
-              <a:rPr lang="en-US" sz="1800" dirty="0" smtClean="0"/>
-              <a:t>Test, test, test…</a:t>
-            </a:r>
-          </a:p>
-          <a:p>
-            <a:pPr lvl="1"/>
-            <a:endParaRPr lang="en-US" sz="1800" dirty="0"/>
+              <a:rPr lang="en-US" dirty="0" smtClean="0"/>
+              <a:t>JavaScript</a:t>
+            </a:r>
+          </a:p>
+          <a:p>
+            <a:r>
+              <a:rPr lang="en-US" dirty="0" smtClean="0"/>
+              <a:t>Remember…you are developing a web app, not a native mobile app</a:t>
+            </a:r>
+            <a:endParaRPr lang="en-US" dirty="0"/>
           </a:p>
         </p:txBody>
       </p:sp>
     </p:spTree>
     <p:extLst>
       <p:ext uri="{BB962C8B-B14F-4D97-AF65-F5344CB8AC3E}">
-        <p14:creationId xmlns:p14="http://schemas.microsoft.com/office/powerpoint/2010/main" val="3593851343"/>
+        <p14:creationId xmlns:p14="http://schemas.microsoft.com/office/powerpoint/2010/main" val="3501575519"/>
       </p:ext>
     </p:extLst>
   </p:cSld>
@@ -10459,7 +11085,7 @@
           <a:p>
             <a:r>
               <a:rPr lang="en-US" dirty="0" smtClean="0"/>
-              <a:t>Project Structure</a:t>
+              <a:t>Getting Started</a:t>
             </a:r>
             <a:endParaRPr lang="en-US" dirty="0"/>
           </a:p>
@@ -10481,162 +11107,95 @@
           <a:lstStyle/>
           <a:p>
             <a:r>
-              <a:rPr lang="en-US" sz="1600" dirty="0" smtClean="0"/>
-              <a:t>Single project directory for </a:t>
-            </a:r>
-            <a:r>
-              <a:rPr lang="en-US" sz="1600" dirty="0" err="1" smtClean="0"/>
-              <a:t>iOS</a:t>
-            </a:r>
-            <a:r>
-              <a:rPr lang="en-US" sz="1600" dirty="0" smtClean="0"/>
-              <a:t> and Android</a:t>
-            </a:r>
-          </a:p>
-          <a:p>
-            <a:r>
-              <a:rPr lang="en-US" sz="1600" dirty="0" smtClean="0"/>
-              <a:t>Files organized by type (HTML, JS, CSS, etc.)</a:t>
+              <a:rPr lang="en-US" sz="2200" dirty="0" smtClean="0"/>
+              <a:t>IDEs </a:t>
+            </a:r>
+            <a:r>
+              <a:rPr lang="en-US" sz="2200" dirty="0"/>
+              <a:t>and SDKs</a:t>
             </a:r>
           </a:p>
           <a:p>
             <a:pPr lvl="1"/>
             <a:r>
+              <a:rPr lang="en-US" sz="1800" dirty="0"/>
+              <a:t>Java IDE that supports building Android APK</a:t>
+            </a:r>
+          </a:p>
+          <a:p>
+            <a:pPr lvl="2"/>
+            <a:r>
+              <a:rPr lang="en-US" sz="1400" dirty="0"/>
+              <a:t>Eclipse</a:t>
+            </a:r>
+          </a:p>
+          <a:p>
+            <a:pPr lvl="2"/>
+            <a:r>
+              <a:rPr lang="en-US" sz="1400" dirty="0"/>
+              <a:t>IntelliJ IDEA – Much better support for HTML5 / CSS / JavaScript</a:t>
+            </a:r>
+          </a:p>
+          <a:p>
+            <a:pPr lvl="1"/>
+            <a:r>
+              <a:rPr lang="en-US" sz="1800" dirty="0"/>
+              <a:t>Android SDK</a:t>
+            </a:r>
+          </a:p>
+          <a:p>
+            <a:pPr lvl="1"/>
+            <a:r>
+              <a:rPr lang="en-US" sz="1800" dirty="0"/>
+              <a:t>Xcode 4 with iOS </a:t>
+            </a:r>
+            <a:r>
+              <a:rPr lang="en-US" sz="1800" dirty="0" smtClean="0"/>
+              <a:t>SDK</a:t>
+            </a:r>
+          </a:p>
+          <a:p>
+            <a:r>
+              <a:rPr lang="en-US" sz="2200" dirty="0" smtClean="0"/>
+              <a:t>SQLite desktop client</a:t>
+            </a:r>
+          </a:p>
+          <a:p>
+            <a:r>
+              <a:rPr lang="en-US" sz="2200" dirty="0" smtClean="0"/>
+              <a:t>Devices</a:t>
+            </a:r>
+          </a:p>
+          <a:p>
+            <a:pPr lvl="1"/>
+            <a:r>
               <a:rPr lang="en-US" sz="1400" dirty="0" smtClean="0"/>
-              <a:t>Think website development</a:t>
-            </a:r>
-          </a:p>
-          <a:p>
-            <a:r>
-              <a:rPr lang="en-US" sz="1600" dirty="0" smtClean="0"/>
-              <a:t>.project / .</a:t>
-            </a:r>
-            <a:r>
-              <a:rPr lang="en-US" sz="1600" dirty="0" err="1" smtClean="0"/>
-              <a:t>classpath</a:t>
-            </a:r>
-            <a:r>
-              <a:rPr lang="en-US" sz="1600" dirty="0" smtClean="0"/>
-              <a:t> for Eclipse, .</a:t>
-            </a:r>
-            <a:r>
-              <a:rPr lang="en-US" sz="1600" dirty="0" err="1" smtClean="0"/>
-              <a:t>xcodeproj</a:t>
-            </a:r>
-            <a:r>
-              <a:rPr lang="en-US" sz="1600" dirty="0" smtClean="0"/>
-              <a:t> for </a:t>
-            </a:r>
-            <a:r>
-              <a:rPr lang="en-US" sz="1600" dirty="0" err="1" smtClean="0"/>
-              <a:t>Xcode</a:t>
-            </a:r>
-            <a:endParaRPr lang="en-US" sz="1600" dirty="0" smtClean="0"/>
+              <a:t>Get real hardware for devices you intend to target</a:t>
+            </a:r>
           </a:p>
           <a:p>
             <a:pPr lvl="1"/>
             <a:r>
-              <a:rPr lang="en-US" sz="1200" dirty="0" smtClean="0"/>
-              <a:t>Native Android code: </a:t>
-            </a:r>
-            <a:r>
-              <a:rPr lang="en-US" sz="1200" dirty="0" err="1" smtClean="0"/>
-              <a:t>src</a:t>
-            </a:r>
-            <a:r>
-              <a:rPr lang="en-US" sz="1200" dirty="0" smtClean="0"/>
-              <a:t>/&lt;package name&gt;</a:t>
-            </a:r>
-          </a:p>
-          <a:p>
-            <a:pPr lvl="1"/>
-            <a:r>
-              <a:rPr lang="en-US" sz="1200" dirty="0" smtClean="0"/>
-              <a:t>Native </a:t>
-            </a:r>
-            <a:r>
-              <a:rPr lang="en-US" sz="1200" dirty="0" err="1" smtClean="0"/>
-              <a:t>iOS</a:t>
-            </a:r>
-            <a:r>
-              <a:rPr lang="en-US" sz="1200" dirty="0" smtClean="0"/>
-              <a:t> code: &lt;</a:t>
-            </a:r>
-            <a:r>
-              <a:rPr lang="en-US" sz="1200" dirty="0" err="1" smtClean="0"/>
-              <a:t>projectname</a:t>
-            </a:r>
-            <a:r>
-              <a:rPr lang="en-US" sz="1200" dirty="0" smtClean="0"/>
-              <a:t>&gt;/classes</a:t>
-            </a:r>
-          </a:p>
-          <a:p>
-            <a:r>
-              <a:rPr lang="en-US" sz="1600" dirty="0" smtClean="0"/>
-              <a:t>Minifying JS files not necessary</a:t>
-            </a:r>
-          </a:p>
-          <a:p>
-            <a:pPr lvl="1"/>
+              <a:rPr lang="en-US" sz="1400" dirty="0" err="1" smtClean="0"/>
+              <a:t>iPad</a:t>
+            </a:r>
             <a:r>
               <a:rPr lang="en-US" sz="1400" dirty="0" smtClean="0"/>
-              <a:t>Offers insignificant load time improvement</a:t>
-            </a:r>
-            <a:endParaRPr lang="en-US" sz="2000" dirty="0" smtClean="0"/>
-          </a:p>
-          <a:p>
-            <a:r>
-              <a:rPr lang="en-US" sz="1600" dirty="0" smtClean="0"/>
-              <a:t>Whitelist external hosts</a:t>
-            </a:r>
-          </a:p>
-          <a:p>
-            <a:r>
-              <a:rPr lang="en-US" sz="1600" dirty="0" smtClean="0"/>
-              <a:t>GOTCHAs:</a:t>
-            </a:r>
-          </a:p>
-          <a:p>
-            <a:pPr lvl="1"/>
-            <a:r>
-              <a:rPr lang="en-US" sz="1400" dirty="0" smtClean="0"/>
-              <a:t>No source level JS debugging on device. Use </a:t>
-            </a:r>
-            <a:r>
-              <a:rPr lang="en-US" sz="1400" dirty="0" err="1" smtClean="0"/>
-              <a:t>console.log</a:t>
-            </a:r>
-            <a:r>
-              <a:rPr lang="en-US" sz="1400" dirty="0"/>
-              <a:t> </a:t>
-            </a:r>
-            <a:r>
-              <a:rPr lang="en-US" sz="1400" dirty="0" smtClean="0"/>
-              <a:t>or debug using WebKit based browser (Chrome or Safari)</a:t>
-            </a:r>
-            <a:endParaRPr lang="en-US" sz="1400" dirty="0" smtClean="0"/>
-          </a:p>
-          <a:p>
-            <a:pPr lvl="1"/>
-            <a:r>
-              <a:rPr lang="en-US" sz="1400" dirty="0" smtClean="0"/>
-              <a:t>Phonegap JS library is platform specific</a:t>
-            </a:r>
-          </a:p>
-          <a:p>
-            <a:r>
-              <a:rPr lang="en-US" sz="1600" dirty="0" smtClean="0"/>
-              <a:t>Demo</a:t>
-            </a:r>
-            <a:endParaRPr lang="en-US" sz="1600" dirty="0"/>
+              <a:t> simulator OK to get started, Android emulator is not</a:t>
+            </a:r>
+          </a:p>
+          <a:p>
+            <a:endParaRPr lang="en-US" sz="2200" dirty="0"/>
+          </a:p>
+          <a:p>
+            <a:endParaRPr lang="en-US" sz="2200" dirty="0"/>
           </a:p>
         </p:txBody>
       </p:sp>
     </p:spTree>
     <p:extLst>
       <p:ext uri="{BB962C8B-B14F-4D97-AF65-F5344CB8AC3E}">
-        <p14:creationId xmlns:p14="http://schemas.microsoft.com/office/powerpoint/2010/main" val="1674381301"/>
+        <p14:creationId xmlns:p14="http://schemas.microsoft.com/office/powerpoint/2010/main" val="3593851343"/>
       </p:ext>
     </p:extLst>
   </p:cSld>
@@ -10680,7 +11239,7 @@
           <a:p>
             <a:r>
               <a:rPr lang="en-US" dirty="0" smtClean="0"/>
-              <a:t>Data Management</a:t>
+              <a:t>Project Structure</a:t>
             </a:r>
             <a:endParaRPr lang="en-US" dirty="0"/>
           </a:p>
@@ -10703,90 +11262,123 @@
           <a:p>
             <a:r>
               <a:rPr lang="en-US" sz="1800" dirty="0" smtClean="0"/>
-              <a:t>JSON</a:t>
-            </a:r>
+              <a:t>Single project directory for </a:t>
+            </a:r>
+            <a:r>
+              <a:rPr lang="en-US" sz="1800" dirty="0" err="1" smtClean="0"/>
+              <a:t>iOS</a:t>
+            </a:r>
+            <a:r>
+              <a:rPr lang="en-US" sz="1800" dirty="0" smtClean="0"/>
+              <a:t> and Android</a:t>
+            </a:r>
+          </a:p>
+          <a:p>
+            <a:r>
+              <a:rPr lang="en-US" sz="1800" dirty="0" smtClean="0"/>
+              <a:t>Files organized by type (HTML, JS, CSS, etc.</a:t>
+            </a:r>
+            <a:r>
+              <a:rPr lang="en-US" sz="1800" dirty="0" smtClean="0"/>
+              <a:t>) under assets/www</a:t>
+            </a:r>
+          </a:p>
+          <a:p>
+            <a:r>
+              <a:rPr lang="en-US" sz="1800" dirty="0" smtClean="0"/>
+              <a:t>Native “bootstrap” code</a:t>
+            </a:r>
+            <a:endParaRPr lang="en-US" sz="1800" dirty="0" smtClean="0"/>
           </a:p>
           <a:p>
             <a:pPr lvl="1"/>
             <a:r>
-              <a:rPr lang="en-US" sz="1600" dirty="0" smtClean="0"/>
-              <a:t>Ideal data interchange format for JS</a:t>
+              <a:rPr lang="en-US" sz="1400" dirty="0" smtClean="0"/>
+              <a:t>Android: </a:t>
+            </a:r>
+            <a:r>
+              <a:rPr lang="en-US" sz="1400" dirty="0" err="1"/>
+              <a:t>src</a:t>
+            </a:r>
+            <a:r>
+              <a:rPr lang="en-US" sz="1400" dirty="0"/>
+              <a:t>/&lt;package name&gt;</a:t>
             </a:r>
           </a:p>
           <a:p>
             <a:pPr lvl="1"/>
             <a:r>
-              <a:rPr lang="en-US" sz="1600" dirty="0" smtClean="0"/>
-              <a:t>Easily maps to/from JS objects</a:t>
-            </a:r>
-          </a:p>
-          <a:p>
-            <a:pPr lvl="1"/>
-            <a:r>
-              <a:rPr lang="en-US" sz="1600" dirty="0" smtClean="0"/>
-              <a:t>“Human readable”</a:t>
+              <a:rPr lang="en-US" sz="1400" dirty="0" smtClean="0"/>
+              <a:t>iOS: </a:t>
+            </a:r>
+            <a:r>
+              <a:rPr lang="en-US" sz="1400" dirty="0"/>
+              <a:t>&lt;</a:t>
+            </a:r>
+            <a:r>
+              <a:rPr lang="en-US" sz="1400" dirty="0" err="1"/>
+              <a:t>projectname</a:t>
+            </a:r>
+            <a:r>
+              <a:rPr lang="en-US" sz="1400" dirty="0"/>
+              <a:t>&gt;/classes</a:t>
             </a:r>
           </a:p>
           <a:p>
             <a:r>
               <a:rPr lang="en-US" sz="1800" dirty="0" smtClean="0"/>
-              <a:t>HTML5 Local Storage</a:t>
-            </a:r>
-          </a:p>
-          <a:p>
-            <a:pPr lvl="1"/>
-            <a:r>
-              <a:rPr lang="en-US" sz="1600" dirty="0" smtClean="0"/>
-              <a:t>Fast, reliable, persistent across pages / sessions / app restarts</a:t>
-            </a:r>
-          </a:p>
-          <a:p>
-            <a:pPr lvl="1"/>
-            <a:r>
-              <a:rPr lang="en-US" sz="1600" dirty="0"/>
-              <a:t>Broad browser support</a:t>
-            </a:r>
-          </a:p>
-          <a:p>
-            <a:pPr lvl="1"/>
-            <a:r>
-              <a:rPr lang="en-US" sz="1600" dirty="0" smtClean="0"/>
-              <a:t>Ideal for storing JSON data, state information across pages</a:t>
-            </a:r>
-          </a:p>
-          <a:p>
-            <a:r>
-              <a:rPr lang="en-US" sz="2000" dirty="0" smtClean="0"/>
-              <a:t>GOTCHAs:</a:t>
-            </a:r>
-          </a:p>
-          <a:p>
-            <a:pPr lvl="1"/>
-            <a:r>
-              <a:rPr lang="en-US" sz="1600" dirty="0" smtClean="0"/>
-              <a:t>Hard 5 MB limit</a:t>
-            </a:r>
-          </a:p>
-          <a:p>
-            <a:pPr lvl="1"/>
-            <a:r>
-              <a:rPr lang="en-US" sz="1600" dirty="0" smtClean="0"/>
-              <a:t>Desktop browser testing requires local file access permission</a:t>
-            </a:r>
-          </a:p>
-          <a:p>
-            <a:r>
-              <a:rPr lang="en-US" sz="2000" dirty="0" smtClean="0"/>
+              <a:t>Eclipse - </a:t>
+            </a:r>
+            <a:r>
+              <a:rPr lang="en-US" sz="1800" dirty="0" smtClean="0"/>
+              <a:t>.project / .</a:t>
+            </a:r>
+            <a:r>
+              <a:rPr lang="en-US" sz="1800" dirty="0" err="1" smtClean="0"/>
+              <a:t>classpath</a:t>
+            </a:r>
+            <a:endParaRPr lang="en-US" sz="1400" dirty="0" smtClean="0"/>
+          </a:p>
+          <a:p>
+            <a:r>
+              <a:rPr lang="en-US" sz="1800" dirty="0" smtClean="0"/>
+              <a:t>IntelliJ IDEA - .idea</a:t>
+            </a:r>
+          </a:p>
+          <a:p>
+            <a:r>
+              <a:rPr lang="en-US" sz="1800" dirty="0" smtClean="0"/>
+              <a:t>Xcode - .</a:t>
+            </a:r>
+            <a:r>
+              <a:rPr lang="en-US" sz="1800" dirty="0" err="1"/>
+              <a:t>xcodeproj</a:t>
+            </a:r>
+            <a:endParaRPr lang="en-US" sz="1400" dirty="0" smtClean="0"/>
+          </a:p>
+          <a:p>
+            <a:r>
+              <a:rPr lang="en-US" sz="1800" dirty="0" smtClean="0"/>
+              <a:t>Whitelist </a:t>
+            </a:r>
+            <a:r>
+              <a:rPr lang="en-US" sz="1800" dirty="0" smtClean="0"/>
+              <a:t>external hosts</a:t>
+            </a:r>
+          </a:p>
+          <a:p>
+            <a:r>
+              <a:rPr lang="en-US" sz="1800" dirty="0" smtClean="0"/>
               <a:t>Demo</a:t>
             </a:r>
-            <a:endParaRPr lang="en-US" sz="2000" dirty="0"/>
+            <a:endParaRPr lang="en-US" sz="1800" dirty="0"/>
           </a:p>
         </p:txBody>
       </p:sp>
     </p:spTree>
     <p:extLst>
       <p:ext uri="{BB962C8B-B14F-4D97-AF65-F5344CB8AC3E}">
-        <p14:creationId xmlns:p14="http://schemas.microsoft.com/office/powerpoint/2010/main" val="2789833064"/>
+        <p14:creationId xmlns:p14="http://schemas.microsoft.com/office/powerpoint/2010/main" val="1674381301"/>
       </p:ext>
     </p:extLst>
   </p:cSld>
@@ -10852,92 +11444,91 @@
           <a:lstStyle/>
           <a:p>
             <a:r>
-              <a:rPr lang="en-US" sz="2400" dirty="0" smtClean="0"/>
-              <a:t>Web SQL Database</a:t>
+              <a:rPr lang="en-US" sz="1800" dirty="0" smtClean="0"/>
+              <a:t>JSON</a:t>
             </a:r>
           </a:p>
           <a:p>
             <a:pPr lvl="1"/>
             <a:r>
+              <a:rPr lang="en-US" sz="1600" dirty="0" smtClean="0"/>
+              <a:t>Ideal data interchange format for JS</a:t>
+            </a:r>
+          </a:p>
+          <a:p>
+            <a:pPr lvl="1"/>
+            <a:r>
+              <a:rPr lang="en-US" sz="1600" dirty="0" smtClean="0"/>
+              <a:t>Easily maps to/from JS objects</a:t>
+            </a:r>
+          </a:p>
+          <a:p>
+            <a:pPr lvl="1"/>
+            <a:r>
+              <a:rPr lang="en-US" sz="1600" dirty="0" smtClean="0"/>
+              <a:t>“Human readable”</a:t>
+            </a:r>
+          </a:p>
+          <a:p>
+            <a:r>
+              <a:rPr lang="en-US" sz="1800" dirty="0" smtClean="0"/>
+              <a:t>HTML5 Local Storage</a:t>
+            </a:r>
+          </a:p>
+          <a:p>
+            <a:pPr lvl="1"/>
+            <a:r>
+              <a:rPr lang="en-US" sz="1600" dirty="0" smtClean="0"/>
+              <a:t>Fast, reliable, persistent across pages / sessions / app restarts</a:t>
+            </a:r>
+          </a:p>
+          <a:p>
+            <a:pPr lvl="1"/>
+            <a:r>
+              <a:rPr lang="en-US" sz="1600" dirty="0"/>
+              <a:t>Broad browser support</a:t>
+            </a:r>
+          </a:p>
+          <a:p>
+            <a:pPr lvl="1"/>
+            <a:r>
+              <a:rPr lang="en-US" sz="1600" dirty="0" smtClean="0"/>
+              <a:t>Ideal for storing JSON data, state information across pages</a:t>
+            </a:r>
+          </a:p>
+          <a:p>
+            <a:r>
               <a:rPr lang="en-US" sz="2000" dirty="0" smtClean="0"/>
-              <a:t>Solves </a:t>
-            </a:r>
-            <a:r>
-              <a:rPr lang="en-US" sz="2000" smtClean="0"/>
-              <a:t>5 MB </a:t>
-            </a:r>
+              <a:t>GOTCHAs:</a:t>
+            </a:r>
+          </a:p>
+          <a:p>
+            <a:pPr lvl="1"/>
+            <a:r>
+              <a:rPr lang="en-US" sz="1600" dirty="0" smtClean="0"/>
+              <a:t>Hard 5 MB limit</a:t>
+            </a:r>
+          </a:p>
+          <a:p>
+            <a:pPr lvl="1"/>
+            <a:r>
+              <a:rPr lang="en-US" sz="1600" dirty="0" smtClean="0"/>
+              <a:t>Desktop browser testing requires local file access permission</a:t>
+            </a:r>
+          </a:p>
+          <a:p>
             <a:r>
               <a:rPr lang="en-US" sz="2000" dirty="0" smtClean="0"/>
-              <a:t>local storage limit</a:t>
-            </a:r>
-          </a:p>
-          <a:p>
-            <a:pPr lvl="1"/>
-            <a:r>
-              <a:rPr lang="en-US" sz="2000" dirty="0" smtClean="0"/>
-              <a:t>Broad mobile / desktop browser support</a:t>
-            </a:r>
-          </a:p>
-          <a:p>
-            <a:pPr lvl="1"/>
-            <a:r>
-              <a:rPr lang="en-US" sz="2000" dirty="0" smtClean="0"/>
-              <a:t>Based on SQLite</a:t>
-            </a:r>
-          </a:p>
-          <a:p>
-            <a:pPr lvl="1"/>
-            <a:r>
-              <a:rPr lang="en-US" sz="2000" dirty="0" smtClean="0"/>
-              <a:t>Databases can be preloaded and packaged with mobile app</a:t>
-            </a:r>
-          </a:p>
-          <a:p>
-            <a:pPr lvl="1"/>
-            <a:r>
-              <a:rPr lang="en-US" sz="2000" dirty="0"/>
-              <a:t>All queries execute asynchronously</a:t>
-            </a:r>
-          </a:p>
-          <a:p>
-            <a:pPr lvl="1"/>
-            <a:r>
-              <a:rPr lang="en-US" sz="2000" dirty="0" smtClean="0"/>
-              <a:t>All queries are transactional</a:t>
-            </a:r>
-          </a:p>
-          <a:p>
-            <a:pPr lvl="1"/>
-            <a:r>
-              <a:rPr lang="en-US" sz="2000" dirty="0" smtClean="0"/>
-              <a:t>GOTCHA? Deprecated by W3C</a:t>
-            </a:r>
-          </a:p>
-          <a:p>
-            <a:pPr lvl="2"/>
-            <a:r>
-              <a:rPr lang="en-US" sz="1600" dirty="0" smtClean="0"/>
-              <a:t>Why not IndexedDB?  Not supported by mobile browsers.</a:t>
-            </a:r>
-          </a:p>
-          <a:p>
-            <a:r>
-              <a:rPr lang="en-US" sz="2400" dirty="0" smtClean="0"/>
               <a:t>Demo</a:t>
             </a:r>
-          </a:p>
-          <a:p>
-            <a:pPr marL="0" indent="0">
-              <a:buNone/>
-            </a:pPr>
-            <a:endParaRPr lang="en-US" sz="2400" dirty="0"/>
+            <a:endParaRPr lang="en-US" sz="2000" dirty="0"/>
           </a:p>
         </p:txBody>
       </p:sp>
     </p:spTree>
     <p:extLst>
       <p:ext uri="{BB962C8B-B14F-4D97-AF65-F5344CB8AC3E}">
-        <p14:creationId xmlns:p14="http://schemas.microsoft.com/office/powerpoint/2010/main" val="906434659"/>
+        <p14:creationId xmlns:p14="http://schemas.microsoft.com/office/powerpoint/2010/main" val="2789833064"/>
       </p:ext>
     </p:extLst>
   </p:cSld>

</xml_diff>

<commit_message>
Minor updates after dry run at TDCI.
</commit_message>
<xml_diff>
--- a/RealWorldMobileAppDevelopment.pptx
+++ b/RealWorldMobileAppDevelopment.pptx
@@ -514,7 +514,7 @@
             <a:fld id="{E6D40A8B-9DB3-D940-9E32-81E2BCF9697E}" type="datetimeFigureOut">
               <a:rPr lang="en-US"/>
               <a:pPr/>
-              <a:t>4/20/13</a:t>
+              <a:t>5/8/13</a:t>
             </a:fld>
             <a:endParaRPr lang="en-US"/>
           </a:p>
@@ -1809,6 +1809,40 @@
               <a:rPr lang="en-US" baseline="0" dirty="0" smtClean="0"/>
               <a:t>Choose supported devices up front and code to those resolutions</a:t>
             </a:r>
+          </a:p>
+          <a:p>
+            <a:pPr marL="171450" indent="-171450">
+              <a:buFontTx/>
+              <a:buChar char="-"/>
+            </a:pPr>
+            <a:r>
+              <a:rPr lang="en-US" baseline="0" dirty="0" smtClean="0"/>
+              <a:t>Android browser changes in Samsung Galaxy Tab 2 10.1</a:t>
+            </a:r>
+          </a:p>
+          <a:p>
+            <a:pPr marL="628650" lvl="1" indent="-171450">
+              <a:buFontTx/>
+              <a:buChar char="-"/>
+            </a:pPr>
+            <a:r>
+              <a:rPr lang="en-US" baseline="0" dirty="0" smtClean="0"/>
+              <a:t>Native select does not work inside fixed / absolute positioned div</a:t>
+            </a:r>
+          </a:p>
+          <a:p>
+            <a:pPr marL="628650" lvl="1" indent="-171450">
+              <a:buFontTx/>
+              <a:buChar char="-"/>
+            </a:pPr>
+            <a:r>
+              <a:rPr lang="en-US" baseline="0" dirty="0" smtClean="0"/>
+              <a:t>Native select </a:t>
+            </a:r>
+            <a:r>
+              <a:rPr lang="en-US" baseline="0" smtClean="0"/>
+              <a:t>UI change</a:t>
+            </a:r>
             <a:endParaRPr lang="en-US" dirty="0"/>
           </a:p>
         </p:txBody>
@@ -2210,8 +2244,21 @@
             </a:r>
             <a:r>
               <a:rPr lang="en-US" baseline="0" dirty="0" smtClean="0"/>
-              <a:t> Phonegap docs website</a:t>
-            </a:r>
+              <a:t> Phonegap docs website - http://</a:t>
+            </a:r>
+            <a:r>
+              <a:rPr lang="en-US" baseline="0" dirty="0" err="1" smtClean="0"/>
+              <a:t>docs.phonegap.com</a:t>
+            </a:r>
+            <a:r>
+              <a:rPr lang="en-US" baseline="0" dirty="0" smtClean="0"/>
+              <a:t>/en/2.3.0/</a:t>
+            </a:r>
+            <a:r>
+              <a:rPr lang="en-US" baseline="0" dirty="0" err="1" smtClean="0"/>
+              <a:t>index.html</a:t>
+            </a:r>
+            <a:endParaRPr lang="en-US" baseline="0" dirty="0" smtClean="0"/>
           </a:p>
         </p:txBody>
       </p:sp>
@@ -2405,34 +2452,6 @@
           <a:bodyPr/>
           <a:lstStyle/>
           <a:p>
-            <a:r>
-              <a:rPr lang="en-US" dirty="0" smtClean="0"/>
-              <a:t>Talking points:</a:t>
-            </a:r>
-          </a:p>
-          <a:p>
-            <a:pPr marL="171450" indent="-171450">
-              <a:buFontTx/>
-              <a:buChar char="-"/>
-            </a:pPr>
-            <a:r>
-              <a:rPr lang="en-US" dirty="0" smtClean="0"/>
-              <a:t>Is it really necessary to support</a:t>
-            </a:r>
-            <a:r>
-              <a:rPr lang="en-US" baseline="0" dirty="0" smtClean="0"/>
-              <a:t> portrait and landscape?</a:t>
-            </a:r>
-          </a:p>
-          <a:p>
-            <a:pPr marL="171450" indent="-171450">
-              <a:buFontTx/>
-              <a:buChar char="-"/>
-            </a:pPr>
-            <a:r>
-              <a:rPr lang="en-US" baseline="0" dirty="0" smtClean="0"/>
-              <a:t>Choose supported devices up front and code to those resolutions</a:t>
-            </a:r>
             <a:endParaRPr lang="en-US" dirty="0"/>
           </a:p>
         </p:txBody>
@@ -8535,15 +8554,7 @@
             <a:pPr lvl="1"/>
             <a:r>
               <a:rPr lang="en-US" sz="2000" dirty="0" smtClean="0"/>
-              <a:t>Solves </a:t>
-            </a:r>
-            <a:r>
-              <a:rPr lang="en-US" sz="2000" smtClean="0"/>
-              <a:t>5 MB </a:t>
-            </a:r>
-            <a:r>
-              <a:rPr lang="en-US" sz="2000" dirty="0" smtClean="0"/>
-              <a:t>local storage limit</a:t>
+              <a:t>Solves 5 MB local storage limit</a:t>
             </a:r>
           </a:p>
           <a:p>
@@ -8593,12 +8604,6 @@
             <a:r>
               <a:rPr lang="en-US" sz="1600" dirty="0" smtClean="0"/>
               <a:t>Why not IndexedDB?  Not supported by mobile browsers.</a:t>
-            </a:r>
-          </a:p>
-          <a:p>
-            <a:r>
-              <a:rPr lang="en-US" sz="2400" dirty="0" smtClean="0"/>
-              <a:t>Demo</a:t>
             </a:r>
           </a:p>
           <a:p>
@@ -8695,15 +8700,10 @@
           <a:p>
             <a:r>
               <a:rPr lang="en-US" dirty="0" smtClean="0"/>
-              <a:t>Easily map JSON data to data models</a:t>
-            </a:r>
-            <a:endParaRPr lang="en-US" dirty="0"/>
-          </a:p>
-          <a:p>
-            <a:r>
-              <a:rPr lang="en-US" dirty="0" smtClean="0"/>
-              <a:t>Demo</a:t>
-            </a:r>
+              <a:t>Easily map JSON data to data model</a:t>
+            </a:r>
+          </a:p>
+          <a:p>
             <a:endParaRPr lang="en-US" dirty="0"/>
           </a:p>
         </p:txBody>
@@ -8839,13 +8839,6 @@
               <a:t>Delegates to built-in JS functions if present</a:t>
             </a:r>
           </a:p>
-          <a:p>
-            <a:r>
-              <a:rPr lang="en-US" sz="2400" dirty="0" smtClean="0"/>
-              <a:t>Demo</a:t>
-            </a:r>
-            <a:endParaRPr lang="en-US" sz="2400" dirty="0"/>
-          </a:p>
         </p:txBody>
       </p:sp>
     </p:spTree>
@@ -8991,13 +8984,6 @@
               <a:rPr lang="en-US" sz="2000" dirty="0" smtClean="0"/>
               <a:t>Dialogs</a:t>
             </a:r>
-            <a:endParaRPr lang="en-US" sz="2000" dirty="0" smtClean="0"/>
-          </a:p>
-          <a:p>
-            <a:r>
-              <a:rPr lang="en-US" sz="2400" dirty="0" smtClean="0"/>
-              <a:t>Demo</a:t>
-            </a:r>
           </a:p>
         </p:txBody>
       </p:sp>
@@ -9081,7 +9067,6 @@
               <a:rPr lang="en-US" dirty="0" smtClean="0"/>
               <a:t>globalize + jquery-i18n</a:t>
             </a:r>
-            <a:endParaRPr lang="en-US" dirty="0" smtClean="0"/>
           </a:p>
           <a:p>
             <a:r>
@@ -9102,13 +9087,6 @@
               <a:rPr lang="en-US" dirty="0" smtClean="0"/>
               <a:t>Number and date formatting</a:t>
             </a:r>
-          </a:p>
-          <a:p>
-            <a:r>
-              <a:rPr lang="en-US" dirty="0" smtClean="0"/>
-              <a:t>Demo</a:t>
-            </a:r>
-            <a:endParaRPr lang="en-US" dirty="0"/>
           </a:p>
         </p:txBody>
       </p:sp>
@@ -9186,79 +9164,79 @@
           <a:lstStyle/>
           <a:p>
             <a:r>
+              <a:rPr lang="en-US" sz="2400" dirty="0" smtClean="0"/>
+              <a:t>Upgrading libraries</a:t>
+            </a:r>
+          </a:p>
+          <a:p>
+            <a:pPr lvl="1"/>
+            <a:r>
               <a:rPr lang="en-US" sz="2000" dirty="0" smtClean="0"/>
-              <a:t>Upgrading libraries</a:t>
+              <a:t>Be careful!</a:t>
             </a:r>
           </a:p>
           <a:p>
             <a:pPr lvl="1"/>
             <a:r>
+              <a:rPr lang="en-US" sz="2000" dirty="0" smtClean="0"/>
+              <a:t>Phonegap:</a:t>
+            </a:r>
+          </a:p>
+          <a:p>
+            <a:pPr lvl="2"/>
+            <a:r>
               <a:rPr lang="en-US" sz="1800" dirty="0" smtClean="0"/>
-              <a:t>Be careful!</a:t>
-            </a:r>
-          </a:p>
-          <a:p>
-            <a:pPr lvl="1"/>
+              <a:t>API changes / plugin changes</a:t>
+            </a:r>
+          </a:p>
+          <a:p>
+            <a:pPr lvl="2"/>
+            <a:r>
+              <a:rPr lang="en-US" sz="1800" dirty="0"/>
+              <a:t>See http://</a:t>
+            </a:r>
+            <a:r>
+              <a:rPr lang="en-US" sz="1800" dirty="0" err="1"/>
+              <a:t>docs.phonegap.com</a:t>
+            </a:r>
+            <a:r>
+              <a:rPr lang="en-US" sz="1800" dirty="0"/>
+              <a:t>/en/2.6.0/</a:t>
+            </a:r>
             <a:r>
               <a:rPr lang="en-US" sz="1800" dirty="0" smtClean="0"/>
-              <a:t>Phonegap:</a:t>
-            </a:r>
-          </a:p>
-          <a:p>
-            <a:pPr lvl="2"/>
-            <a:r>
-              <a:rPr lang="en-US" sz="1600" dirty="0" smtClean="0"/>
-              <a:t>API changes / plugin changes</a:t>
-            </a:r>
-          </a:p>
-          <a:p>
-            <a:pPr lvl="2"/>
-            <a:r>
-              <a:rPr lang="en-US" sz="1600" dirty="0"/>
-              <a:t>See http://</a:t>
-            </a:r>
-            <a:r>
-              <a:rPr lang="en-US" sz="1600" dirty="0" err="1"/>
-              <a:t>docs.phonegap.com</a:t>
-            </a:r>
-            <a:r>
-              <a:rPr lang="en-US" sz="1600" dirty="0"/>
-              <a:t>/en/2.6.0/</a:t>
-            </a:r>
-            <a:r>
-              <a:rPr lang="en-US" sz="1600" dirty="0" smtClean="0"/>
               <a:t>guide_upgrading_index.md.html</a:t>
             </a:r>
             <a:r>
-              <a:rPr lang="en-US" sz="1600" dirty="0"/>
+              <a:rPr lang="en-US" sz="1800" dirty="0"/>
               <a:t>#Upgrading%</a:t>
             </a:r>
             <a:r>
-              <a:rPr lang="en-US" sz="1600" dirty="0" smtClean="0"/>
+              <a:rPr lang="en-US" sz="1800" dirty="0" smtClean="0"/>
               <a:t>20Guides</a:t>
             </a:r>
           </a:p>
           <a:p>
             <a:r>
-              <a:rPr lang="en-US" sz="2000" dirty="0" smtClean="0"/>
+              <a:rPr lang="en-US" sz="2400" dirty="0" smtClean="0"/>
               <a:t>Android emulator is too slow to be useful</a:t>
             </a:r>
           </a:p>
           <a:p>
             <a:r>
-              <a:rPr lang="en-US" sz="2000" dirty="0" smtClean="0"/>
+              <a:rPr lang="en-US" sz="2400" dirty="0" smtClean="0"/>
               <a:t>Deployment to real iOS device requires Apple iOS Developer membership</a:t>
             </a:r>
-            <a:endParaRPr lang="en-US" sz="1800" dirty="0" smtClean="0"/>
-          </a:p>
-          <a:p>
             <a:endParaRPr lang="en-US" sz="2000" dirty="0" smtClean="0"/>
+          </a:p>
+          <a:p>
+            <a:endParaRPr lang="en-US" sz="2400" dirty="0" smtClean="0"/>
           </a:p>
           <a:p>
             <a:pPr marL="0" indent="0">
               <a:buNone/>
             </a:pPr>
-            <a:endParaRPr lang="en-US" sz="2000" dirty="0"/>
+            <a:endParaRPr lang="en-US" sz="2400" dirty="0"/>
           </a:p>
         </p:txBody>
       </p:sp>
@@ -9398,6 +9376,7 @@
               <a:rPr lang="en-US" sz="1200" dirty="0" smtClean="0"/>
               <a:t>Vendor changes to Android browser – Ex: Samsung Galaxy Tab 2 10.1</a:t>
             </a:r>
+            <a:endParaRPr lang="en-US" sz="800" dirty="0" smtClean="0"/>
           </a:p>
           <a:p>
             <a:r>
@@ -9423,11 +9402,7 @@
             <a:pPr lvl="1"/>
             <a:r>
               <a:rPr lang="en-US" sz="1200" dirty="0" smtClean="0"/>
-              <a:t>Don’t assume that what works on desktop browser will just work on device</a:t>
-            </a:r>
-            <a:r>
-              <a:rPr lang="en-US" sz="1200" dirty="0" smtClean="0"/>
-              <a:t>.</a:t>
+              <a:t>Don’t assume that what works on desktop browser will just work on device.</a:t>
             </a:r>
           </a:p>
           <a:p>
@@ -9436,7 +9411,6 @@
               <a:rPr lang="en-US" sz="1200" dirty="0" smtClean="0"/>
               <a:t>Don’t assume that what works on one Android device will just work on another.</a:t>
             </a:r>
-            <a:endParaRPr lang="en-US" sz="1200" dirty="0" smtClean="0"/>
           </a:p>
           <a:p>
             <a:pPr lvl="1"/>
@@ -9498,7 +9472,7 @@
           <a:p>
             <a:r>
               <a:rPr lang="en-US" dirty="0" smtClean="0"/>
-              <a:t>Debugging</a:t>
+              <a:t>Testing / Debugging</a:t>
             </a:r>
             <a:endParaRPr lang="en-US" dirty="0"/>
           </a:p>
@@ -9521,7 +9495,17 @@
           <a:p>
             <a:r>
               <a:rPr lang="en-US" sz="2400" dirty="0" smtClean="0"/>
-              <a:t>Source level JS debugging on desktop only</a:t>
+              <a:t>Jasmine for automated unit / functional testing</a:t>
+            </a:r>
+          </a:p>
+          <a:p>
+            <a:r>
+              <a:rPr lang="en-US" sz="2400" dirty="0" smtClean="0"/>
+              <a:t>Source </a:t>
+            </a:r>
+            <a:r>
+              <a:rPr lang="en-US" sz="2400" dirty="0" smtClean="0"/>
+              <a:t>level JS debugging on desktop only</a:t>
             </a:r>
           </a:p>
           <a:p>
@@ -9671,6 +9655,40 @@
           </a:p>
           <a:p>
             <a:r>
+              <a:rPr lang="en-US" dirty="0" smtClean="0"/>
+              <a:t>jQuery </a:t>
+            </a:r>
+            <a:r>
+              <a:rPr lang="en-US" dirty="0" err="1" smtClean="0"/>
+              <a:t>BlockUI</a:t>
+            </a:r>
+            <a:endParaRPr lang="en-US" dirty="0" smtClean="0"/>
+          </a:p>
+          <a:p>
+            <a:pPr lvl="1"/>
+            <a:r>
+              <a:rPr lang="en-US" dirty="0"/>
+              <a:t>http://</a:t>
+            </a:r>
+            <a:r>
+              <a:rPr lang="en-US" dirty="0" err="1"/>
+              <a:t>www.malsup.com</a:t>
+            </a:r>
+            <a:r>
+              <a:rPr lang="en-US" dirty="0"/>
+              <a:t>/</a:t>
+            </a:r>
+            <a:r>
+              <a:rPr lang="en-US" dirty="0" err="1"/>
+              <a:t>jquery</a:t>
+            </a:r>
+            <a:r>
+              <a:rPr lang="en-US" dirty="0"/>
+              <a:t>/block/</a:t>
+            </a:r>
+          </a:p>
+          <a:p>
+            <a:r>
               <a:rPr lang="en-US" dirty="0" err="1" smtClean="0"/>
               <a:t>Mobiscroll</a:t>
             </a:r>
@@ -9710,11 +9728,7 @@
           <a:p>
             <a:r>
               <a:rPr lang="en-US" dirty="0" smtClean="0"/>
-              <a:t>Signature </a:t>
-            </a:r>
-            <a:r>
-              <a:rPr lang="en-US" dirty="0" smtClean="0"/>
-              <a:t>Pad</a:t>
+              <a:t>Signature Pad</a:t>
             </a:r>
           </a:p>
           <a:p>
@@ -9897,7 +9911,6 @@
               <a:rPr lang="en-US" sz="1600" dirty="0"/>
               <a:t>/demos/1.3.0/</a:t>
             </a:r>
-            <a:endParaRPr lang="en-US" sz="1600" dirty="0"/>
           </a:p>
           <a:p>
             <a:r>
@@ -10072,7 +10085,6 @@
               <a:rPr lang="en-US" sz="1800" dirty="0" smtClean="0"/>
               <a:t>Introduction / Getting Started</a:t>
             </a:r>
-            <a:endParaRPr lang="en-US" sz="1800" dirty="0" smtClean="0"/>
           </a:p>
           <a:p>
             <a:r>
@@ -10367,11 +10379,7 @@
           <a:p>
             <a:r>
               <a:rPr lang="en-US" sz="1800" dirty="0" smtClean="0"/>
-              <a:t>JSON </a:t>
-            </a:r>
-            <a:r>
-              <a:rPr lang="en-US" sz="1800" dirty="0" smtClean="0"/>
-              <a:t>Validator:</a:t>
+              <a:t>JSON Validator:</a:t>
             </a:r>
           </a:p>
           <a:p>
@@ -10726,94 +10734,60 @@
           <a:lstStyle/>
           <a:p>
             <a:r>
+              <a:rPr lang="en-US" sz="2400" dirty="0" smtClean="0"/>
+              <a:t>About Phonegap</a:t>
+            </a:r>
+          </a:p>
+          <a:p>
+            <a:pPr lvl="1"/>
+            <a:r>
               <a:rPr lang="en-US" sz="2000" dirty="0" smtClean="0"/>
-              <a:t>About Phonegap</a:t>
+              <a:t>Package and distribute a web app as a native app</a:t>
+            </a:r>
+          </a:p>
+          <a:p>
+            <a:pPr lvl="2"/>
+            <a:r>
+              <a:rPr lang="en-US" sz="1800" dirty="0" smtClean="0"/>
+              <a:t>Supported platforms:  Android, Blackberry, </a:t>
+            </a:r>
+            <a:r>
+              <a:rPr lang="en-US" sz="1800" dirty="0" err="1" smtClean="0"/>
+              <a:t>iOS</a:t>
+            </a:r>
+            <a:r>
+              <a:rPr lang="en-US" sz="1800" dirty="0" smtClean="0"/>
+              <a:t>, Symbian, </a:t>
+            </a:r>
+            <a:r>
+              <a:rPr lang="en-US" sz="1800" dirty="0" err="1" smtClean="0"/>
+              <a:t>WebOS</a:t>
+            </a:r>
+            <a:r>
+              <a:rPr lang="en-US" sz="1800" dirty="0" smtClean="0"/>
+              <a:t>, Windows Phone</a:t>
+            </a:r>
+          </a:p>
+          <a:p>
+            <a:pPr lvl="2"/>
+            <a:r>
+              <a:rPr lang="en-US" sz="1800" dirty="0" smtClean="0"/>
+              <a:t>App runs inside device’s internal browser via web view started by Phonegap provided native code for each platform</a:t>
             </a:r>
           </a:p>
           <a:p>
             <a:pPr lvl="1"/>
             <a:r>
-              <a:rPr lang="en-US" sz="1800" dirty="0" smtClean="0"/>
-              <a:t>Package and distribute a web app as a native app</a:t>
+              <a:rPr lang="en-US" sz="2000" dirty="0" smtClean="0"/>
+              <a:t>Expose device functionality via JavaScript APIs</a:t>
             </a:r>
           </a:p>
           <a:p>
             <a:pPr lvl="2"/>
             <a:r>
               <a:rPr lang="en-US" sz="1600" dirty="0" smtClean="0"/>
-              <a:t>Supported platforms:  Android, Blackberry, </a:t>
-            </a:r>
-            <a:r>
-              <a:rPr lang="en-US" sz="1600" dirty="0" err="1" smtClean="0"/>
-              <a:t>iOS</a:t>
-            </a:r>
-            <a:r>
-              <a:rPr lang="en-US" sz="1600" dirty="0" smtClean="0"/>
-              <a:t>, Symbian, </a:t>
-            </a:r>
-            <a:r>
-              <a:rPr lang="en-US" sz="1600" dirty="0" err="1" smtClean="0"/>
-              <a:t>WebOS</a:t>
-            </a:r>
-            <a:r>
-              <a:rPr lang="en-US" sz="1600" dirty="0" smtClean="0"/>
-              <a:t>, Windows Phone</a:t>
-            </a:r>
-          </a:p>
-          <a:p>
-            <a:pPr lvl="2"/>
-            <a:r>
-              <a:rPr lang="en-US" sz="1600" dirty="0" smtClean="0"/>
-              <a:t>App runs inside device’s internal browser via web view started by Phonegap provided native code for each platform</a:t>
-            </a:r>
-          </a:p>
-          <a:p>
-            <a:pPr lvl="1"/>
-            <a:r>
-              <a:rPr lang="en-US" sz="1800" dirty="0" smtClean="0"/>
-              <a:t>Expose device functionality via JavaScript APIs</a:t>
-            </a:r>
-          </a:p>
-          <a:p>
-            <a:pPr lvl="2"/>
-            <a:r>
-              <a:rPr lang="en-US" sz="1400" dirty="0" smtClean="0"/>
               <a:t>Examples: Camera, Compass, Contacts, GPS, Device Events, </a:t>
             </a:r>
-          </a:p>
-          <a:p>
-            <a:pPr lvl="1"/>
-            <a:r>
-              <a:rPr lang="en-US" sz="1800" dirty="0" smtClean="0"/>
-              <a:t>Requirements:</a:t>
-            </a:r>
-          </a:p>
-          <a:p>
-            <a:pPr lvl="2"/>
-            <a:r>
-              <a:rPr lang="en-US" sz="1600" dirty="0" smtClean="0"/>
-              <a:t>Android: </a:t>
-            </a:r>
-            <a:r>
-              <a:rPr lang="en-US" sz="1600" dirty="0" smtClean="0"/>
-              <a:t>Eclipse / IntelliJ IDEA, </a:t>
-            </a:r>
-            <a:r>
-              <a:rPr lang="en-US" sz="1600" dirty="0" smtClean="0"/>
-              <a:t>Android SDK, JDK</a:t>
-            </a:r>
-          </a:p>
-          <a:p>
-            <a:pPr lvl="2"/>
-            <a:r>
-              <a:rPr lang="en-US" sz="1600" dirty="0" smtClean="0"/>
-              <a:t>iOS: Xcode with iOS </a:t>
-            </a:r>
-            <a:r>
-              <a:rPr lang="en-US" sz="1600" dirty="0" smtClean="0"/>
-              <a:t>SDK</a:t>
-            </a:r>
-            <a:endParaRPr lang="en-US" sz="1600" dirty="0" smtClean="0"/>
           </a:p>
         </p:txBody>
       </p:sp>
@@ -11185,6 +11159,10 @@
             </a:r>
           </a:p>
           <a:p>
+            <a:r>
+              <a:rPr lang="en-US" sz="2200" dirty="0" smtClean="0"/>
+              <a:t>Phonegap provides scripts to create new projects</a:t>
+            </a:r>
             <a:endParaRPr lang="en-US" sz="2200" dirty="0"/>
           </a:p>
           <a:p>
@@ -11276,11 +11254,7 @@
           <a:p>
             <a:r>
               <a:rPr lang="en-US" sz="1800" dirty="0" smtClean="0"/>
-              <a:t>Files organized by type (HTML, JS, CSS, etc.</a:t>
-            </a:r>
-            <a:r>
-              <a:rPr lang="en-US" sz="1800" dirty="0" smtClean="0"/>
-              <a:t>) under assets/www</a:t>
+              <a:t>Files organized by type (HTML, JS, CSS, etc.) under assets/www</a:t>
             </a:r>
           </a:p>
           <a:p>
@@ -11288,7 +11262,6 @@
               <a:rPr lang="en-US" sz="1800" dirty="0" smtClean="0"/>
               <a:t>Native “bootstrap” code</a:t>
             </a:r>
-            <a:endParaRPr lang="en-US" sz="1800" dirty="0" smtClean="0"/>
           </a:p>
           <a:p>
             <a:pPr lvl="1"/>
@@ -11327,11 +11300,7 @@
           <a:p>
             <a:r>
               <a:rPr lang="en-US" sz="1800" dirty="0" smtClean="0"/>
-              <a:t>Eclipse - </a:t>
-            </a:r>
-            <a:r>
-              <a:rPr lang="en-US" sz="1800" dirty="0" smtClean="0"/>
-              <a:t>.project / .</a:t>
+              <a:t>Eclipse - .project / .</a:t>
             </a:r>
             <a:r>
               <a:rPr lang="en-US" sz="1800" dirty="0" err="1" smtClean="0"/>
@@ -11342,8 +11311,13 @@
           <a:p>
             <a:r>
               <a:rPr lang="en-US" sz="1800" dirty="0" smtClean="0"/>
-              <a:t>IntelliJ IDEA - .idea</a:t>
-            </a:r>
+              <a:t>IntelliJ IDEA - .</a:t>
+            </a:r>
+            <a:r>
+              <a:rPr lang="en-US" sz="1800" dirty="0" smtClean="0"/>
+              <a:t>idea</a:t>
+            </a:r>
+            <a:endParaRPr lang="en-US" sz="1800" dirty="0" smtClean="0"/>
           </a:p>
           <a:p>
             <a:r>
@@ -11359,18 +11333,18 @@
           <a:p>
             <a:r>
               <a:rPr lang="en-US" sz="1800" dirty="0" smtClean="0"/>
-              <a:t>Whitelist </a:t>
-            </a:r>
-            <a:r>
-              <a:rPr lang="en-US" sz="1800" dirty="0" smtClean="0"/>
-              <a:t>external hosts</a:t>
-            </a:r>
-          </a:p>
-          <a:p>
-            <a:r>
-              <a:rPr lang="en-US" sz="1800" dirty="0" smtClean="0"/>
-              <a:t>Demo</a:t>
-            </a:r>
+              <a:t>Whitelist external hosts via </a:t>
+            </a:r>
+            <a:r>
+              <a:rPr lang="en-US" sz="1800" dirty="0" err="1" smtClean="0"/>
+              <a:t>config.xml</a:t>
+            </a:r>
+            <a:endParaRPr lang="en-US" sz="1800" dirty="0" smtClean="0"/>
+          </a:p>
+          <a:p>
+            <a:pPr marL="0" indent="0">
+              <a:buNone/>
+            </a:pPr>
             <a:endParaRPr lang="en-US" sz="1800" dirty="0"/>
           </a:p>
         </p:txBody>
@@ -11513,15 +11487,19 @@
             <a:pPr lvl="1"/>
             <a:r>
               <a:rPr lang="en-US" sz="1600" dirty="0" smtClean="0"/>
-              <a:t>Desktop browser testing requires local file access permission</a:t>
-            </a:r>
-          </a:p>
-          <a:p>
-            <a:r>
-              <a:rPr lang="en-US" sz="2000" dirty="0" smtClean="0"/>
-              <a:t>Demo</a:t>
-            </a:r>
-            <a:endParaRPr lang="en-US" sz="2000" dirty="0"/>
+              <a:t>Chrome Desktop testing requires local file access permission</a:t>
+            </a:r>
+          </a:p>
+          <a:p>
+            <a:pPr lvl="2"/>
+            <a:r>
+              <a:rPr lang="en-US" sz="1200" dirty="0"/>
+              <a:t>--allow-file-access-from-files --disable-web-</a:t>
+            </a:r>
+            <a:r>
+              <a:rPr lang="en-US" sz="1200" dirty="0" smtClean="0"/>
+              <a:t>security</a:t>
+            </a:r>
           </a:p>
         </p:txBody>
       </p:sp>

</xml_diff>

<commit_message>
StirTrek updates, add note about Android emulator GPU / VM acceleration
</commit_message>
<xml_diff>
--- a/RealWorldMobileAppDevelopment.pptx
+++ b/RealWorldMobileAppDevelopment.pptx
@@ -514,7 +514,7 @@
             <a:fld id="{E6D40A8B-9DB3-D940-9E32-81E2BCF9697E}" type="datetimeFigureOut">
               <a:rPr lang="en-US"/>
               <a:pPr/>
-              <a:t>5/8/13</a:t>
+              <a:t>5/20/13</a:t>
             </a:fld>
             <a:endParaRPr lang="en-US"/>
           </a:p>
@@ -8487,6 +8487,13 @@
   <p:clrMapOvr>
     <a:masterClrMapping/>
   </p:clrMapOvr>
+  <p:timing>
+    <p:tnLst>
+      <p:par>
+        <p:cTn xmlns:p14="http://schemas.microsoft.com/office/powerpoint/2010/main" id="1" dur="indefinite" restart="never" nodeType="tmRoot"/>
+      </p:par>
+    </p:tnLst>
+  </p:timing>
 </p:sld>
 </file>
 
@@ -8624,6 +8631,13 @@
   <p:clrMapOvr>
     <a:masterClrMapping/>
   </p:clrMapOvr>
+  <p:timing>
+    <p:tnLst>
+      <p:par>
+        <p:cTn xmlns:p14="http://schemas.microsoft.com/office/powerpoint/2010/main" id="1" dur="indefinite" restart="never" nodeType="tmRoot"/>
+      </p:par>
+    </p:tnLst>
+  </p:timing>
 </p:sld>
 </file>
 
@@ -8718,6 +8732,13 @@
   <p:clrMapOvr>
     <a:masterClrMapping/>
   </p:clrMapOvr>
+  <p:timing>
+    <p:tnLst>
+      <p:par>
+        <p:cTn xmlns:p14="http://schemas.microsoft.com/office/powerpoint/2010/main" id="1" dur="indefinite" restart="never" nodeType="tmRoot"/>
+      </p:par>
+    </p:tnLst>
+  </p:timing>
 </p:sld>
 </file>
 
@@ -8851,6 +8872,13 @@
   <p:clrMapOvr>
     <a:masterClrMapping/>
   </p:clrMapOvr>
+  <p:timing>
+    <p:tnLst>
+      <p:par>
+        <p:cTn xmlns:p14="http://schemas.microsoft.com/office/powerpoint/2010/main" id="1" dur="indefinite" restart="never" nodeType="tmRoot"/>
+      </p:par>
+    </p:tnLst>
+  </p:timing>
 </p:sld>
 </file>
 
@@ -8997,6 +9025,13 @@
   <p:clrMapOvr>
     <a:masterClrMapping/>
   </p:clrMapOvr>
+  <p:timing>
+    <p:tnLst>
+      <p:par>
+        <p:cTn xmlns:p14="http://schemas.microsoft.com/office/powerpoint/2010/main" id="1" dur="indefinite" restart="never" nodeType="tmRoot"/>
+      </p:par>
+    </p:tnLst>
+  </p:timing>
 </p:sld>
 </file>
 
@@ -9100,6 +9135,13 @@
   <p:clrMapOvr>
     <a:masterClrMapping/>
   </p:clrMapOvr>
+  <p:timing>
+    <p:tnLst>
+      <p:par>
+        <p:cTn xmlns:p14="http://schemas.microsoft.com/office/powerpoint/2010/main" id="1" dur="indefinite" restart="never" nodeType="tmRoot"/>
+      </p:par>
+    </p:tnLst>
+  </p:timing>
 </p:sld>
 </file>
 
@@ -9164,79 +9206,99 @@
           <a:lstStyle/>
           <a:p>
             <a:r>
-              <a:rPr lang="en-US" sz="2400" dirty="0" smtClean="0"/>
+              <a:rPr lang="en-US" sz="2000" dirty="0" smtClean="0"/>
               <a:t>Upgrading libraries</a:t>
             </a:r>
           </a:p>
           <a:p>
             <a:pPr lvl="1"/>
             <a:r>
+              <a:rPr lang="en-US" sz="1800" dirty="0" smtClean="0"/>
+              <a:t>Be careful!</a:t>
+            </a:r>
+          </a:p>
+          <a:p>
+            <a:pPr lvl="1"/>
+            <a:r>
+              <a:rPr lang="en-US" sz="1800" dirty="0" smtClean="0"/>
+              <a:t>Phonegap:</a:t>
+            </a:r>
+          </a:p>
+          <a:p>
+            <a:pPr lvl="2"/>
+            <a:r>
+              <a:rPr lang="en-US" sz="1600" dirty="0" smtClean="0"/>
+              <a:t>API changes / plugin changes</a:t>
+            </a:r>
+          </a:p>
+          <a:p>
+            <a:pPr lvl="2"/>
+            <a:r>
+              <a:rPr lang="en-US" sz="1600" dirty="0"/>
+              <a:t>See http://</a:t>
+            </a:r>
+            <a:r>
+              <a:rPr lang="en-US" sz="1600" dirty="0" err="1"/>
+              <a:t>docs.phonegap.com</a:t>
+            </a:r>
+            <a:r>
+              <a:rPr lang="en-US" sz="1600" dirty="0"/>
+              <a:t>/en/2.6.0/</a:t>
+            </a:r>
+            <a:r>
+              <a:rPr lang="en-US" sz="1600" dirty="0" smtClean="0"/>
+              <a:t>guide_upgrading_index.md.html</a:t>
+            </a:r>
+            <a:r>
+              <a:rPr lang="en-US" sz="1600" dirty="0"/>
+              <a:t>#Upgrading%</a:t>
+            </a:r>
+            <a:r>
+              <a:rPr lang="en-US" sz="1600" dirty="0" smtClean="0"/>
+              <a:t>20Guides</a:t>
+            </a:r>
+          </a:p>
+          <a:p>
+            <a:r>
               <a:rPr lang="en-US" sz="2000" dirty="0" smtClean="0"/>
-              <a:t>Be careful!</a:t>
+              <a:t>Use Android emulator with GPU / VM acceleration</a:t>
             </a:r>
           </a:p>
           <a:p>
             <a:pPr lvl="1"/>
             <a:r>
+              <a:rPr lang="en-US" sz="1600" dirty="0"/>
+              <a:t>http://</a:t>
+            </a:r>
+            <a:r>
+              <a:rPr lang="en-US" sz="1600" dirty="0" err="1"/>
+              <a:t>developer.android.com</a:t>
+            </a:r>
+            <a:r>
+              <a:rPr lang="en-US" sz="1600" dirty="0"/>
+              <a:t>/tools/devices/</a:t>
+            </a:r>
+            <a:r>
+              <a:rPr lang="en-US" sz="1600"/>
+              <a:t>emulator.html</a:t>
+            </a:r>
+            <a:endParaRPr lang="en-US" sz="1600" dirty="0" smtClean="0"/>
+          </a:p>
+          <a:p>
+            <a:r>
               <a:rPr lang="en-US" sz="2000" dirty="0" smtClean="0"/>
-              <a:t>Phonegap:</a:t>
-            </a:r>
-          </a:p>
-          <a:p>
-            <a:pPr lvl="2"/>
-            <a:r>
-              <a:rPr lang="en-US" sz="1800" dirty="0" smtClean="0"/>
-              <a:t>API changes / plugin changes</a:t>
-            </a:r>
-          </a:p>
-          <a:p>
-            <a:pPr lvl="2"/>
-            <a:r>
-              <a:rPr lang="en-US" sz="1800" dirty="0"/>
-              <a:t>See http://</a:t>
-            </a:r>
-            <a:r>
-              <a:rPr lang="en-US" sz="1800" dirty="0" err="1"/>
-              <a:t>docs.phonegap.com</a:t>
-            </a:r>
-            <a:r>
-              <a:rPr lang="en-US" sz="1800" dirty="0"/>
-              <a:t>/en/2.6.0/</a:t>
-            </a:r>
-            <a:r>
-              <a:rPr lang="en-US" sz="1800" dirty="0" smtClean="0"/>
-              <a:t>guide_upgrading_index.md.html</a:t>
-            </a:r>
-            <a:r>
-              <a:rPr lang="en-US" sz="1800" dirty="0"/>
-              <a:t>#Upgrading%</a:t>
-            </a:r>
-            <a:r>
-              <a:rPr lang="en-US" sz="1800" dirty="0" smtClean="0"/>
-              <a:t>20Guides</a:t>
-            </a:r>
-          </a:p>
-          <a:p>
-            <a:r>
-              <a:rPr lang="en-US" sz="2400" dirty="0" smtClean="0"/>
-              <a:t>Android emulator is too slow to be useful</a:t>
-            </a:r>
-          </a:p>
-          <a:p>
-            <a:r>
-              <a:rPr lang="en-US" sz="2400" dirty="0" smtClean="0"/>
               <a:t>Deployment to real iOS device requires Apple iOS Developer membership</a:t>
             </a:r>
+            <a:endParaRPr lang="en-US" sz="1800" dirty="0" smtClean="0"/>
+          </a:p>
+          <a:p>
             <a:endParaRPr lang="en-US" sz="2000" dirty="0" smtClean="0"/>
-          </a:p>
-          <a:p>
-            <a:endParaRPr lang="en-US" sz="2400" dirty="0" smtClean="0"/>
           </a:p>
           <a:p>
             <a:pPr marL="0" indent="0">
               <a:buNone/>
             </a:pPr>
-            <a:endParaRPr lang="en-US" sz="2400" dirty="0"/>
+            <a:endParaRPr lang="en-US" sz="2000" dirty="0"/>
           </a:p>
         </p:txBody>
       </p:sp>
@@ -9250,6 +9312,13 @@
   <p:clrMapOvr>
     <a:masterClrMapping/>
   </p:clrMapOvr>
+  <p:timing>
+    <p:tnLst>
+      <p:par>
+        <p:cTn xmlns:p14="http://schemas.microsoft.com/office/powerpoint/2010/main" id="1" dur="indefinite" restart="never" nodeType="tmRoot"/>
+      </p:par>
+    </p:tnLst>
+  </p:timing>
 </p:sld>
 </file>
 
@@ -9435,6 +9504,13 @@
   <p:clrMapOvr>
     <a:masterClrMapping/>
   </p:clrMapOvr>
+  <p:timing>
+    <p:tnLst>
+      <p:par>
+        <p:cTn xmlns:p14="http://schemas.microsoft.com/office/powerpoint/2010/main" id="1" dur="indefinite" restart="never" nodeType="tmRoot"/>
+      </p:par>
+    </p:tnLst>
+  </p:timing>
 </p:sld>
 </file>
 
@@ -9472,7 +9548,7 @@
           <a:p>
             <a:r>
               <a:rPr lang="en-US" dirty="0" smtClean="0"/>
-              <a:t>Testing / Debugging</a:t>
+              <a:t>Debugging</a:t>
             </a:r>
             <a:endParaRPr lang="en-US" dirty="0"/>
           </a:p>
@@ -9495,17 +9571,7 @@
           <a:p>
             <a:r>
               <a:rPr lang="en-US" sz="2400" dirty="0" smtClean="0"/>
-              <a:t>Jasmine for automated unit / functional testing</a:t>
-            </a:r>
-          </a:p>
-          <a:p>
-            <a:r>
-              <a:rPr lang="en-US" sz="2400" dirty="0" smtClean="0"/>
-              <a:t>Source </a:t>
-            </a:r>
-            <a:r>
-              <a:rPr lang="en-US" sz="2400" dirty="0" smtClean="0"/>
-              <a:t>level JS debugging on desktop only</a:t>
+              <a:t>Source level JS debugging on desktop only</a:t>
             </a:r>
           </a:p>
           <a:p>
@@ -9563,6 +9629,13 @@
   <p:clrMapOvr>
     <a:masterClrMapping/>
   </p:clrMapOvr>
+  <p:timing>
+    <p:tnLst>
+      <p:par>
+        <p:cTn xmlns:p14="http://schemas.microsoft.com/office/powerpoint/2010/main" id="1" dur="indefinite" restart="never" nodeType="tmRoot"/>
+      </p:par>
+    </p:tnLst>
+  </p:timing>
 </p:sld>
 </file>
 
@@ -9762,6 +9835,13 @@
   <p:clrMapOvr>
     <a:masterClrMapping/>
   </p:clrMapOvr>
+  <p:timing>
+    <p:tnLst>
+      <p:par>
+        <p:cTn xmlns:p14="http://schemas.microsoft.com/office/powerpoint/2010/main" id="1" dur="indefinite" restart="never" nodeType="tmRoot"/>
+      </p:par>
+    </p:tnLst>
+  </p:timing>
 </p:sld>
 </file>
 
@@ -10018,6 +10098,13 @@
   <p:clrMapOvr>
     <a:masterClrMapping/>
   </p:clrMapOvr>
+  <p:timing>
+    <p:tnLst>
+      <p:par>
+        <p:cTn xmlns:p14="http://schemas.microsoft.com/office/powerpoint/2010/main" id="1" dur="indefinite" restart="never" nodeType="tmRoot"/>
+      </p:par>
+    </p:tnLst>
+  </p:timing>
 </p:sld>
 </file>
 
@@ -10198,6 +10285,13 @@
   <p:clrMapOvr>
     <a:masterClrMapping/>
   </p:clrMapOvr>
+  <p:timing>
+    <p:tnLst>
+      <p:par>
+        <p:cTn xmlns:p14="http://schemas.microsoft.com/office/powerpoint/2010/main" id="1" dur="indefinite" restart="never" nodeType="tmRoot"/>
+      </p:par>
+    </p:tnLst>
+  </p:timing>
 </p:sld>
 </file>
 
@@ -10441,6 +10535,13 @@
   <p:clrMapOvr>
     <a:masterClrMapping/>
   </p:clrMapOvr>
+  <p:timing>
+    <p:tnLst>
+      <p:par>
+        <p:cTn xmlns:p14="http://schemas.microsoft.com/office/powerpoint/2010/main" id="1" dur="indefinite" restart="never" nodeType="tmRoot"/>
+      </p:par>
+    </p:tnLst>
+  </p:timing>
 </p:sld>
 </file>
 
@@ -10545,6 +10646,13 @@
   <p:clrMapOvr>
     <a:masterClrMapping/>
   </p:clrMapOvr>
+  <p:timing>
+    <p:tnLst>
+      <p:par>
+        <p:cTn xmlns:p14="http://schemas.microsoft.com/office/powerpoint/2010/main" id="1" dur="indefinite" restart="never" nodeType="tmRoot"/>
+      </p:par>
+    </p:tnLst>
+  </p:timing>
 </p:sld>
 </file>
 
@@ -10675,6 +10783,13 @@
   <p:clrMapOvr>
     <a:masterClrMapping/>
   </p:clrMapOvr>
+  <p:timing>
+    <p:tnLst>
+      <p:par>
+        <p:cTn xmlns:p14="http://schemas.microsoft.com/office/powerpoint/2010/main" id="1" dur="indefinite" restart="never" nodeType="tmRoot"/>
+      </p:par>
+    </p:tnLst>
+  </p:timing>
 </p:sld>
 </file>
 
@@ -10734,60 +10849,68 @@
           <a:lstStyle/>
           <a:p>
             <a:r>
-              <a:rPr lang="en-US" sz="2400" dirty="0" smtClean="0"/>
+              <a:rPr lang="en-US" sz="2000" dirty="0" smtClean="0"/>
               <a:t>About Phonegap</a:t>
             </a:r>
           </a:p>
           <a:p>
             <a:pPr lvl="1"/>
             <a:r>
-              <a:rPr lang="en-US" sz="2000" dirty="0" smtClean="0"/>
+              <a:rPr lang="en-US" sz="1800" dirty="0" smtClean="0"/>
               <a:t>Package and distribute a web app as a native app</a:t>
             </a:r>
           </a:p>
           <a:p>
             <a:pPr lvl="2"/>
             <a:r>
+              <a:rPr lang="en-US" sz="1600" dirty="0" smtClean="0"/>
+              <a:t>Supported platforms:  Android, Blackberry, </a:t>
+            </a:r>
+            <a:r>
+              <a:rPr lang="en-US" sz="1600" dirty="0" err="1" smtClean="0"/>
+              <a:t>iOS</a:t>
+            </a:r>
+            <a:r>
+              <a:rPr lang="en-US" sz="1600" dirty="0" smtClean="0"/>
+              <a:t>, Symbian, </a:t>
+            </a:r>
+            <a:r>
+              <a:rPr lang="en-US" sz="1600" dirty="0" err="1" smtClean="0"/>
+              <a:t>WebOS</a:t>
+            </a:r>
+            <a:r>
+              <a:rPr lang="en-US" sz="1600" dirty="0" smtClean="0"/>
+              <a:t>, Windows Phone</a:t>
+            </a:r>
+          </a:p>
+          <a:p>
+            <a:pPr lvl="2"/>
+            <a:r>
+              <a:rPr lang="en-US" sz="1600" dirty="0" smtClean="0"/>
+              <a:t>App runs inside device’s internal browser via web view started by Phonegap provided native code for each platform</a:t>
+            </a:r>
+          </a:p>
+          <a:p>
+            <a:pPr lvl="1"/>
+            <a:r>
               <a:rPr lang="en-US" sz="1800" dirty="0" smtClean="0"/>
-              <a:t>Supported platforms:  Android, Blackberry, </a:t>
-            </a:r>
-            <a:r>
-              <a:rPr lang="en-US" sz="1800" dirty="0" err="1" smtClean="0"/>
-              <a:t>iOS</a:t>
-            </a:r>
+              <a:t>Expose device functionality via JavaScript APIs</a:t>
+            </a:r>
+          </a:p>
+          <a:p>
+            <a:pPr lvl="2"/>
+            <a:r>
+              <a:rPr lang="en-US" sz="1400" dirty="0" smtClean="0"/>
+              <a:t>Examples: Camera, Compass, Contacts, GPS, Device Events, </a:t>
+            </a:r>
+          </a:p>
+          <a:p>
+            <a:pPr lvl="1"/>
             <a:r>
               <a:rPr lang="en-US" sz="1800" dirty="0" smtClean="0"/>
-              <a:t>, Symbian, </a:t>
-            </a:r>
-            <a:r>
-              <a:rPr lang="en-US" sz="1800" dirty="0" err="1" smtClean="0"/>
-              <a:t>WebOS</a:t>
-            </a:r>
-            <a:r>
-              <a:rPr lang="en-US" sz="1800" dirty="0" smtClean="0"/>
-              <a:t>, Windows Phone</a:t>
-            </a:r>
-          </a:p>
-          <a:p>
-            <a:pPr lvl="2"/>
-            <a:r>
-              <a:rPr lang="en-US" sz="1800" dirty="0" smtClean="0"/>
-              <a:t>App runs inside device’s internal browser via web view started by Phonegap provided native code for each platform</a:t>
-            </a:r>
-          </a:p>
-          <a:p>
-            <a:pPr lvl="1"/>
-            <a:r>
-              <a:rPr lang="en-US" sz="2000" dirty="0" smtClean="0"/>
-              <a:t>Expose device functionality via JavaScript APIs</a:t>
-            </a:r>
-          </a:p>
-          <a:p>
-            <a:pPr lvl="2"/>
-            <a:r>
-              <a:rPr lang="en-US" sz="1600" dirty="0" smtClean="0"/>
-              <a:t>Examples: Camera, Compass, Contacts, GPS, Device Events, </a:t>
-            </a:r>
+              <a:t>Project creation scripts</a:t>
+            </a:r>
+            <a:endParaRPr lang="en-US" sz="1600" dirty="0" smtClean="0"/>
           </a:p>
         </p:txBody>
       </p:sp>
@@ -10801,6 +10924,13 @@
   <p:clrMapOvr>
     <a:masterClrMapping/>
   </p:clrMapOvr>
+  <p:timing>
+    <p:tnLst>
+      <p:par>
+        <p:cTn xmlns:p14="http://schemas.microsoft.com/office/powerpoint/2010/main" id="1" dur="indefinite" restart="never" nodeType="tmRoot"/>
+      </p:par>
+    </p:tnLst>
+  </p:timing>
 </p:sld>
 </file>
 
@@ -10919,6 +11049,13 @@
   <p:clrMapOvr>
     <a:masterClrMapping/>
   </p:clrMapOvr>
+  <p:timing>
+    <p:tnLst>
+      <p:par>
+        <p:cTn xmlns:p14="http://schemas.microsoft.com/office/powerpoint/2010/main" id="1" dur="indefinite" restart="never" nodeType="tmRoot"/>
+      </p:par>
+    </p:tnLst>
+  </p:timing>
 </p:sld>
 </file>
 
@@ -11022,6 +11159,13 @@
   <p:clrMapOvr>
     <a:masterClrMapping/>
   </p:clrMapOvr>
+  <p:timing>
+    <p:tnLst>
+      <p:par>
+        <p:cTn xmlns:p14="http://schemas.microsoft.com/office/powerpoint/2010/main" id="1" dur="indefinite" restart="never" nodeType="tmRoot"/>
+      </p:par>
+    </p:tnLst>
+  </p:timing>
 </p:sld>
 </file>
 
@@ -11155,14 +11299,17 @@
             </a:r>
             <a:r>
               <a:rPr lang="en-US" sz="1400" dirty="0" smtClean="0"/>
-              <a:t> simulator OK to get started, Android emulator is not</a:t>
-            </a:r>
-          </a:p>
-          <a:p>
-            <a:r>
-              <a:rPr lang="en-US" sz="2200" dirty="0" smtClean="0"/>
-              <a:t>Phonegap provides scripts to create new projects</a:t>
-            </a:r>
+              <a:t> simulator OK to get started</a:t>
+            </a:r>
+          </a:p>
+          <a:p>
+            <a:pPr lvl="1"/>
+            <a:r>
+              <a:rPr lang="en-US" sz="1400" dirty="0" smtClean="0"/>
+              <a:t>Android emulator with GPU / VM acceleration OK to get started</a:t>
+            </a:r>
+          </a:p>
+          <a:p>
             <a:endParaRPr lang="en-US" sz="2200" dirty="0"/>
           </a:p>
           <a:p>
@@ -11180,6 +11327,13 @@
   <p:clrMapOvr>
     <a:masterClrMapping/>
   </p:clrMapOvr>
+  <p:timing>
+    <p:tnLst>
+      <p:par>
+        <p:cTn xmlns:p14="http://schemas.microsoft.com/office/powerpoint/2010/main" id="1" dur="indefinite" restart="never" nodeType="tmRoot"/>
+      </p:par>
+    </p:tnLst>
+  </p:timing>
 </p:sld>
 </file>
 
@@ -11311,13 +11465,8 @@
           <a:p>
             <a:r>
               <a:rPr lang="en-US" sz="1800" dirty="0" smtClean="0"/>
-              <a:t>IntelliJ IDEA - .</a:t>
-            </a:r>
-            <a:r>
-              <a:rPr lang="en-US" sz="1800" dirty="0" smtClean="0"/>
-              <a:t>idea</a:t>
-            </a:r>
-            <a:endParaRPr lang="en-US" sz="1800" dirty="0" smtClean="0"/>
+              <a:t>IntelliJ IDEA - .idea</a:t>
+            </a:r>
           </a:p>
           <a:p>
             <a:r>
@@ -11359,6 +11508,13 @@
   <p:clrMapOvr>
     <a:masterClrMapping/>
   </p:clrMapOvr>
+  <p:timing>
+    <p:tnLst>
+      <p:par>
+        <p:cTn xmlns:p14="http://schemas.microsoft.com/office/powerpoint/2010/main" id="1" dur="indefinite" restart="never" nodeType="tmRoot"/>
+      </p:par>
+    </p:tnLst>
+  </p:timing>
 </p:sld>
 </file>
 
@@ -11513,6 +11669,13 @@
   <p:clrMapOvr>
     <a:masterClrMapping/>
   </p:clrMapOvr>
+  <p:timing>
+    <p:tnLst>
+      <p:par>
+        <p:cTn xmlns:p14="http://schemas.microsoft.com/office/powerpoint/2010/main" id="1" dur="indefinite" restart="never" nodeType="tmRoot"/>
+      </p:par>
+    </p:tnLst>
+  </p:timing>
 </p:sld>
 </file>
 

</xml_diff>